<commit_message>
Modifications Diapo + modifications Spécifications Techniques
Ajout d'autre images
</commit_message>
<xml_diff>
--- a/Diaporama/DIAPO_MATTHEW.pptx
+++ b/Diaporama/DIAPO_MATTHEW.pptx
@@ -9,16 +9,18 @@
     <p:sldId id="258" r:id="rId3"/>
     <p:sldId id="261" r:id="rId4"/>
     <p:sldId id="257" r:id="rId5"/>
-    <p:sldId id="262" r:id="rId6"/>
-    <p:sldId id="259" r:id="rId7"/>
-    <p:sldId id="260" r:id="rId8"/>
-    <p:sldId id="265" r:id="rId9"/>
-    <p:sldId id="266" r:id="rId10"/>
-    <p:sldId id="268" r:id="rId11"/>
-    <p:sldId id="269" r:id="rId12"/>
-    <p:sldId id="264" r:id="rId13"/>
-    <p:sldId id="270" r:id="rId14"/>
-    <p:sldId id="267" r:id="rId15"/>
+    <p:sldId id="272" r:id="rId6"/>
+    <p:sldId id="262" r:id="rId7"/>
+    <p:sldId id="259" r:id="rId8"/>
+    <p:sldId id="260" r:id="rId9"/>
+    <p:sldId id="265" r:id="rId10"/>
+    <p:sldId id="266" r:id="rId11"/>
+    <p:sldId id="268" r:id="rId12"/>
+    <p:sldId id="269" r:id="rId13"/>
+    <p:sldId id="264" r:id="rId14"/>
+    <p:sldId id="270" r:id="rId15"/>
+    <p:sldId id="271" r:id="rId16"/>
+    <p:sldId id="267" r:id="rId17"/>
   </p:sldIdLst>
   <p:sldSz cx="12192000" cy="6858000"/>
   <p:notesSz cx="6858000" cy="9144000"/>
@@ -7742,11 +7744,11 @@
   <p:clrMapOvr>
     <a:masterClrMapping/>
   </p:clrMapOvr>
-  <mc:AlternateContent xmlns:mc="http://schemas.openxmlformats.org/markup-compatibility/2006">
-    <mc:Choice xmlns:p14="http://schemas.microsoft.com/office/powerpoint/2010/main" Requires="p14">
+  <mc:AlternateContent xmlns:mc="http://schemas.openxmlformats.org/markup-compatibility/2006" xmlns:p14="http://schemas.microsoft.com/office/powerpoint/2010/main">
+    <mc:Choice Requires="p14">
       <p:transition p14:dur="10"/>
     </mc:Choice>
-    <mc:Fallback>
+    <mc:Fallback xmlns="">
       <p:transition/>
     </mc:Fallback>
   </mc:AlternateContent>
@@ -7754,6 +7756,348 @@
 </file>
 
 <file path=ppt/slides/slide10.xml><?xml version="1.0" encoding="utf-8"?>
+<p:sld xmlns:a="http://schemas.openxmlformats.org/drawingml/2006/main" xmlns:r="http://schemas.openxmlformats.org/officeDocument/2006/relationships" xmlns:p="http://schemas.openxmlformats.org/presentationml/2006/main">
+  <p:cSld>
+    <p:spTree>
+      <p:nvGrpSpPr>
+        <p:cNvPr id="1" name=""/>
+        <p:cNvGrpSpPr/>
+        <p:nvPr/>
+      </p:nvGrpSpPr>
+      <p:grpSpPr>
+        <a:xfrm>
+          <a:off x="0" y="0"/>
+          <a:ext cx="0" cy="0"/>
+          <a:chOff x="0" y="0"/>
+          <a:chExt cx="0" cy="0"/>
+        </a:xfrm>
+      </p:grpSpPr>
+      <p:sp>
+        <p:nvSpPr>
+          <p:cNvPr id="2" name="Titre 1">
+            <a:extLst>
+              <a:ext uri="{FF2B5EF4-FFF2-40B4-BE49-F238E27FC236}">
+                <a16:creationId xmlns:a16="http://schemas.microsoft.com/office/drawing/2014/main" id="{FB3D87DC-1F1D-44F6-BF92-FACAE24261D3}"/>
+              </a:ext>
+            </a:extLst>
+          </p:cNvPr>
+          <p:cNvSpPr>
+            <a:spLocks noGrp="1"/>
+          </p:cNvSpPr>
+          <p:nvPr>
+            <p:ph type="title"/>
+          </p:nvPr>
+        </p:nvSpPr>
+        <p:spPr/>
+        <p:txBody>
+          <a:bodyPr/>
+          <a:lstStyle/>
+          <a:p>
+            <a:r>
+              <a:rPr lang="fr-FR" dirty="0"/>
+              <a:t>Diagramme de cas d’utilisation</a:t>
+            </a:r>
+          </a:p>
+        </p:txBody>
+      </p:sp>
+      <p:pic>
+        <p:nvPicPr>
+          <p:cNvPr id="4" name="Espace réservé du contenu 4">
+            <a:extLst>
+              <a:ext uri="{FF2B5EF4-FFF2-40B4-BE49-F238E27FC236}">
+                <a16:creationId xmlns:a16="http://schemas.microsoft.com/office/drawing/2014/main" id="{EFBED685-8B33-4694-861C-325FB3929A2D}"/>
+              </a:ext>
+            </a:extLst>
+          </p:cNvPr>
+          <p:cNvPicPr>
+            <a:picLocks noChangeAspect="1"/>
+          </p:cNvPicPr>
+          <p:nvPr/>
+        </p:nvPicPr>
+        <p:blipFill>
+          <a:blip r:embed="rId2" cstate="print">
+            <a:lum bright="70000" contrast="-70000"/>
+            <a:extLst>
+              <a:ext uri="{28A0092B-C50C-407E-A947-70E740481C1C}">
+                <a14:useLocalDpi xmlns:a14="http://schemas.microsoft.com/office/drawing/2010/main" val="0"/>
+              </a:ext>
+            </a:extLst>
+          </a:blip>
+          <a:stretch>
+            <a:fillRect/>
+          </a:stretch>
+        </p:blipFill>
+        <p:spPr>
+          <a:xfrm>
+            <a:off x="5495250" y="6318665"/>
+            <a:ext cx="616018" cy="616018"/>
+          </a:xfrm>
+          <a:prstGeom prst="rect">
+            <a:avLst/>
+          </a:prstGeom>
+        </p:spPr>
+      </p:pic>
+      <p:sp>
+        <p:nvSpPr>
+          <p:cNvPr id="5" name="ZoneTexte 4">
+            <a:extLst>
+              <a:ext uri="{FF2B5EF4-FFF2-40B4-BE49-F238E27FC236}">
+                <a16:creationId xmlns:a16="http://schemas.microsoft.com/office/drawing/2014/main" id="{D352F6DE-74E1-483E-B67D-F979EBF3A6E5}"/>
+              </a:ext>
+            </a:extLst>
+          </p:cNvPr>
+          <p:cNvSpPr txBox="1"/>
+          <p:nvPr/>
+        </p:nvSpPr>
+        <p:spPr>
+          <a:xfrm>
+            <a:off x="1693094" y="6442008"/>
+            <a:ext cx="1068371" cy="369332"/>
+          </a:xfrm>
+          <a:prstGeom prst="rect">
+            <a:avLst/>
+          </a:prstGeom>
+          <a:noFill/>
+        </p:spPr>
+        <p:txBody>
+          <a:bodyPr wrap="square" rtlCol="0">
+            <a:spAutoFit/>
+          </a:bodyPr>
+          <a:lstStyle/>
+          <a:p>
+            <a:pPr algn="just"/>
+            <a:r>
+              <a:rPr lang="fr-FR" dirty="0">
+                <a:solidFill>
+                  <a:schemeClr val="bg1"/>
+                </a:solidFill>
+                <a:latin typeface="Agency FB" panose="020B0503020202020204" pitchFamily="34" charset="0"/>
+              </a:rPr>
+              <a:t>Introduction</a:t>
+            </a:r>
+          </a:p>
+        </p:txBody>
+      </p:sp>
+      <p:sp>
+        <p:nvSpPr>
+          <p:cNvPr id="6" name="ZoneTexte 5">
+            <a:extLst>
+              <a:ext uri="{FF2B5EF4-FFF2-40B4-BE49-F238E27FC236}">
+                <a16:creationId xmlns:a16="http://schemas.microsoft.com/office/drawing/2014/main" id="{81D86E08-6339-4383-8325-EDAB76A83C54}"/>
+              </a:ext>
+            </a:extLst>
+          </p:cNvPr>
+          <p:cNvSpPr txBox="1"/>
+          <p:nvPr/>
+        </p:nvSpPr>
+        <p:spPr>
+          <a:xfrm>
+            <a:off x="3409930" y="6442008"/>
+            <a:ext cx="2107024" cy="369332"/>
+          </a:xfrm>
+          <a:prstGeom prst="rect">
+            <a:avLst/>
+          </a:prstGeom>
+          <a:noFill/>
+        </p:spPr>
+        <p:txBody>
+          <a:bodyPr wrap="square" rtlCol="0">
+            <a:spAutoFit/>
+          </a:bodyPr>
+          <a:lstStyle/>
+          <a:p>
+            <a:pPr algn="just"/>
+            <a:r>
+              <a:rPr lang="fr-FR" dirty="0">
+                <a:solidFill>
+                  <a:schemeClr val="bg1"/>
+                </a:solidFill>
+                <a:latin typeface="Agency FB" panose="020B0503020202020204" pitchFamily="34" charset="0"/>
+              </a:rPr>
+              <a:t>Présentation de PROXIDEJ</a:t>
+            </a:r>
+          </a:p>
+        </p:txBody>
+      </p:sp>
+      <p:sp>
+        <p:nvSpPr>
+          <p:cNvPr id="7" name="ZoneTexte 6">
+            <a:extLst>
+              <a:ext uri="{FF2B5EF4-FFF2-40B4-BE49-F238E27FC236}">
+                <a16:creationId xmlns:a16="http://schemas.microsoft.com/office/drawing/2014/main" id="{C9A37364-4A84-47BF-A57F-321191E60553}"/>
+              </a:ext>
+            </a:extLst>
+          </p:cNvPr>
+          <p:cNvSpPr txBox="1"/>
+          <p:nvPr/>
+        </p:nvSpPr>
+        <p:spPr>
+          <a:xfrm>
+            <a:off x="6089564" y="6442008"/>
+            <a:ext cx="1409469" cy="369332"/>
+          </a:xfrm>
+          <a:prstGeom prst="rect">
+            <a:avLst/>
+          </a:prstGeom>
+          <a:noFill/>
+        </p:spPr>
+        <p:txBody>
+          <a:bodyPr wrap="square" rtlCol="0">
+            <a:spAutoFit/>
+          </a:bodyPr>
+          <a:lstStyle/>
+          <a:p>
+            <a:pPr algn="just"/>
+            <a:r>
+              <a:rPr lang="fr-FR" dirty="0">
+                <a:solidFill>
+                  <a:schemeClr val="bg1"/>
+                </a:solidFill>
+                <a:latin typeface="Agency FB" panose="020B0503020202020204" pitchFamily="34" charset="0"/>
+              </a:rPr>
+              <a:t>Projet en groupe</a:t>
+            </a:r>
+          </a:p>
+        </p:txBody>
+      </p:sp>
+      <p:sp>
+        <p:nvSpPr>
+          <p:cNvPr id="8" name="ZoneTexte 7">
+            <a:extLst>
+              <a:ext uri="{FF2B5EF4-FFF2-40B4-BE49-F238E27FC236}">
+                <a16:creationId xmlns:a16="http://schemas.microsoft.com/office/drawing/2014/main" id="{0122A37C-47EF-4B7C-BC12-8DABA46D1C2D}"/>
+              </a:ext>
+            </a:extLst>
+          </p:cNvPr>
+          <p:cNvSpPr txBox="1"/>
+          <p:nvPr/>
+        </p:nvSpPr>
+        <p:spPr>
+          <a:xfrm>
+            <a:off x="8071644" y="6442008"/>
+            <a:ext cx="1409468" cy="369332"/>
+          </a:xfrm>
+          <a:prstGeom prst="rect">
+            <a:avLst/>
+          </a:prstGeom>
+          <a:noFill/>
+        </p:spPr>
+        <p:txBody>
+          <a:bodyPr wrap="square" rtlCol="0">
+            <a:spAutoFit/>
+          </a:bodyPr>
+          <a:lstStyle/>
+          <a:p>
+            <a:pPr algn="just"/>
+            <a:r>
+              <a:rPr lang="fr-FR" dirty="0">
+                <a:solidFill>
+                  <a:schemeClr val="bg1"/>
+                </a:solidFill>
+                <a:latin typeface="Agency FB" panose="020B0503020202020204" pitchFamily="34" charset="0"/>
+              </a:rPr>
+              <a:t>Projet personnel</a:t>
+            </a:r>
+          </a:p>
+        </p:txBody>
+      </p:sp>
+      <p:sp>
+        <p:nvSpPr>
+          <p:cNvPr id="9" name="ZoneTexte 8">
+            <a:extLst>
+              <a:ext uri="{FF2B5EF4-FFF2-40B4-BE49-F238E27FC236}">
+                <a16:creationId xmlns:a16="http://schemas.microsoft.com/office/drawing/2014/main" id="{775A2C69-534C-4F39-AE40-F365CD14DDA9}"/>
+              </a:ext>
+            </a:extLst>
+          </p:cNvPr>
+          <p:cNvSpPr txBox="1"/>
+          <p:nvPr/>
+        </p:nvSpPr>
+        <p:spPr>
+          <a:xfrm>
+            <a:off x="10053722" y="6442008"/>
+            <a:ext cx="1040998" cy="369332"/>
+          </a:xfrm>
+          <a:prstGeom prst="rect">
+            <a:avLst/>
+          </a:prstGeom>
+          <a:noFill/>
+        </p:spPr>
+        <p:txBody>
+          <a:bodyPr wrap="square" rtlCol="0">
+            <a:spAutoFit/>
+          </a:bodyPr>
+          <a:lstStyle/>
+          <a:p>
+            <a:pPr algn="just"/>
+            <a:r>
+              <a:rPr lang="fr-FR" dirty="0">
+                <a:solidFill>
+                  <a:schemeClr val="bg1"/>
+                </a:solidFill>
+                <a:latin typeface="Agency FB" panose="020B0503020202020204" pitchFamily="34" charset="0"/>
+              </a:rPr>
+              <a:t>Conclusion</a:t>
+            </a:r>
+          </a:p>
+        </p:txBody>
+      </p:sp>
+      <p:pic>
+        <p:nvPicPr>
+          <p:cNvPr id="12" name="Image 11">
+            <a:extLst>
+              <a:ext uri="{FF2B5EF4-FFF2-40B4-BE49-F238E27FC236}">
+                <a16:creationId xmlns:a16="http://schemas.microsoft.com/office/drawing/2014/main" id="{4AD395AB-A6D5-46E9-BE82-434A0C631BAB}"/>
+              </a:ext>
+            </a:extLst>
+          </p:cNvPr>
+          <p:cNvPicPr>
+            <a:picLocks noChangeAspect="1"/>
+          </p:cNvPicPr>
+          <p:nvPr/>
+        </p:nvPicPr>
+        <p:blipFill>
+          <a:blip r:embed="rId3"/>
+          <a:stretch>
+            <a:fillRect/>
+          </a:stretch>
+        </p:blipFill>
+        <p:spPr>
+          <a:xfrm>
+            <a:off x="2489309" y="1819965"/>
+            <a:ext cx="6055289" cy="4416095"/>
+          </a:xfrm>
+          <a:prstGeom prst="rect">
+            <a:avLst/>
+          </a:prstGeom>
+        </p:spPr>
+      </p:pic>
+    </p:spTree>
+    <p:extLst>
+      <p:ext uri="{BB962C8B-B14F-4D97-AF65-F5344CB8AC3E}">
+        <p14:creationId xmlns:p14="http://schemas.microsoft.com/office/powerpoint/2010/main" val="726529839"/>
+      </p:ext>
+    </p:extLst>
+  </p:cSld>
+  <p:clrMapOvr>
+    <a:masterClrMapping/>
+  </p:clrMapOvr>
+  <mc:AlternateContent xmlns:mc="http://schemas.openxmlformats.org/markup-compatibility/2006" xmlns:p14="http://schemas.microsoft.com/office/powerpoint/2010/main">
+    <mc:Choice Requires="p14">
+      <p:transition spd="slow" p14:dur="2000">
+        <p:push dir="u"/>
+      </p:transition>
+    </mc:Choice>
+    <mc:Fallback xmlns="">
+      <p:transition spd="slow">
+        <p:push dir="u"/>
+      </p:transition>
+    </mc:Fallback>
+  </mc:AlternateContent>
+</p:sld>
+</file>
+
+<file path=ppt/slides/slide11.xml><?xml version="1.0" encoding="utf-8"?>
 <p:sld xmlns:a="http://schemas.openxmlformats.org/drawingml/2006/main" xmlns:r="http://schemas.openxmlformats.org/officeDocument/2006/relationships" xmlns:p="http://schemas.openxmlformats.org/presentationml/2006/main">
   <p:cSld>
     <p:spTree>
@@ -8134,13 +8478,13 @@
   <p:clrMapOvr>
     <a:masterClrMapping/>
   </p:clrMapOvr>
-  <mc:AlternateContent xmlns:mc="http://schemas.openxmlformats.org/markup-compatibility/2006">
-    <mc:Choice xmlns:p159="http://schemas.microsoft.com/office/powerpoint/2015/09/main" Requires="p159">
-      <p:transition xmlns:p14="http://schemas.microsoft.com/office/powerpoint/2010/main" spd="slow" p14:dur="2000">
+  <mc:AlternateContent xmlns:mc="http://schemas.openxmlformats.org/markup-compatibility/2006" xmlns:p159="http://schemas.microsoft.com/office/powerpoint/2015/09/main">
+    <mc:Choice Requires="p159">
+      <p:transition spd="slow">
         <p159:morph option="byObject"/>
       </p:transition>
     </mc:Choice>
-    <mc:Fallback>
+    <mc:Fallback xmlns="">
       <p:transition spd="slow">
         <p:fade/>
       </p:transition>
@@ -8260,7 +8604,7 @@
 </p:sld>
 </file>
 
-<file path=ppt/slides/slide11.xml><?xml version="1.0" encoding="utf-8"?>
+<file path=ppt/slides/slide12.xml><?xml version="1.0" encoding="utf-8"?>
 <p:sld xmlns:a="http://schemas.openxmlformats.org/drawingml/2006/main" xmlns:r="http://schemas.openxmlformats.org/officeDocument/2006/relationships" xmlns:p="http://schemas.openxmlformats.org/presentationml/2006/main">
   <p:cSld>
     <p:spTree>
@@ -8641,13 +8985,13 @@
   <p:clrMapOvr>
     <a:masterClrMapping/>
   </p:clrMapOvr>
-  <mc:AlternateContent xmlns:mc="http://schemas.openxmlformats.org/markup-compatibility/2006">
-    <mc:Choice xmlns:p159="http://schemas.microsoft.com/office/powerpoint/2015/09/main" Requires="p159">
+  <mc:AlternateContent xmlns:mc="http://schemas.openxmlformats.org/markup-compatibility/2006" xmlns:p159="http://schemas.microsoft.com/office/powerpoint/2015/09/main">
+    <mc:Choice Requires="p159">
       <p:transition xmlns:p14="http://schemas.microsoft.com/office/powerpoint/2010/main" spd="slow" p14:dur="2000">
         <p159:morph option="byObject"/>
       </p:transition>
     </mc:Choice>
-    <mc:Fallback>
+    <mc:Fallback xmlns="">
       <p:transition spd="slow">
         <p:fade/>
       </p:transition>
@@ -8656,7 +9000,7 @@
 </p:sld>
 </file>
 
-<file path=ppt/slides/slide12.xml><?xml version="1.0" encoding="utf-8"?>
+<file path=ppt/slides/slide13.xml><?xml version="1.0" encoding="utf-8"?>
 <p:sld xmlns:a="http://schemas.openxmlformats.org/drawingml/2006/main" xmlns:r="http://schemas.openxmlformats.org/officeDocument/2006/relationships" xmlns:p="http://schemas.openxmlformats.org/presentationml/2006/main">
   <p:cSld>
     <p:spTree>
@@ -9208,9 +9552,18 @@
   <p:clrMapOvr>
     <a:masterClrMapping/>
   </p:clrMapOvr>
-  <p:transition spd="slow">
-    <p:push dir="u"/>
-  </p:transition>
+  <mc:AlternateContent xmlns:mc="http://schemas.openxmlformats.org/markup-compatibility/2006" xmlns:p14="http://schemas.microsoft.com/office/powerpoint/2010/main">
+    <mc:Choice Requires="p14">
+      <p:transition spd="slow" p14:dur="2000">
+        <p:push dir="u"/>
+      </p:transition>
+    </mc:Choice>
+    <mc:Fallback xmlns="">
+      <p:transition spd="slow">
+        <p:push dir="u"/>
+      </p:transition>
+    </mc:Fallback>
+  </mc:AlternateContent>
   <p:timing>
     <p:tnLst>
       <p:par>
@@ -9370,7 +9723,7 @@
 </p:sld>
 </file>
 
-<file path=ppt/slides/slide13.xml><?xml version="1.0" encoding="utf-8"?>
+<file path=ppt/slides/slide14.xml><?xml version="1.0" encoding="utf-8"?>
 <p:sld xmlns:a="http://schemas.openxmlformats.org/drawingml/2006/main" xmlns:r="http://schemas.openxmlformats.org/officeDocument/2006/relationships" xmlns:p="http://schemas.openxmlformats.org/presentationml/2006/main">
   <p:cSld>
     <p:spTree>
@@ -9880,9 +10233,18 @@
   <p:clrMapOvr>
     <a:masterClrMapping/>
   </p:clrMapOvr>
-  <p:transition spd="slow">
-    <p:push dir="u"/>
-  </p:transition>
+  <mc:AlternateContent xmlns:mc="http://schemas.openxmlformats.org/markup-compatibility/2006" xmlns:p14="http://schemas.microsoft.com/office/powerpoint/2010/main">
+    <mc:Choice Requires="p14">
+      <p:transition spd="slow" p14:dur="2000">
+        <p:push dir="u"/>
+      </p:transition>
+    </mc:Choice>
+    <mc:Fallback xmlns="">
+      <p:transition spd="slow">
+        <p:push dir="u"/>
+      </p:transition>
+    </mc:Fallback>
+  </mc:AlternateContent>
   <p:timing>
     <p:tnLst>
       <p:par>
@@ -10152,7 +10514,441 @@
 </p:sld>
 </file>
 
-<file path=ppt/slides/slide14.xml><?xml version="1.0" encoding="utf-8"?>
+<file path=ppt/slides/slide15.xml><?xml version="1.0" encoding="utf-8"?>
+<p:sld xmlns:a="http://schemas.openxmlformats.org/drawingml/2006/main" xmlns:r="http://schemas.openxmlformats.org/officeDocument/2006/relationships" xmlns:p="http://schemas.openxmlformats.org/presentationml/2006/main">
+  <p:cSld>
+    <p:spTree>
+      <p:nvGrpSpPr>
+        <p:cNvPr id="1" name=""/>
+        <p:cNvGrpSpPr/>
+        <p:nvPr/>
+      </p:nvGrpSpPr>
+      <p:grpSpPr>
+        <a:xfrm>
+          <a:off x="0" y="0"/>
+          <a:ext cx="0" cy="0"/>
+          <a:chOff x="0" y="0"/>
+          <a:chExt cx="0" cy="0"/>
+        </a:xfrm>
+      </p:grpSpPr>
+      <p:sp>
+        <p:nvSpPr>
+          <p:cNvPr id="2" name="Titre 1">
+            <a:extLst>
+              <a:ext uri="{FF2B5EF4-FFF2-40B4-BE49-F238E27FC236}">
+                <a16:creationId xmlns:a16="http://schemas.microsoft.com/office/drawing/2014/main" id="{5F56F51A-8228-488D-86B2-C8EF138BFDD9}"/>
+              </a:ext>
+            </a:extLst>
+          </p:cNvPr>
+          <p:cNvSpPr>
+            <a:spLocks noGrp="1"/>
+          </p:cNvSpPr>
+          <p:nvPr>
+            <p:ph type="title"/>
+          </p:nvPr>
+        </p:nvSpPr>
+        <p:spPr/>
+        <p:txBody>
+          <a:bodyPr/>
+          <a:lstStyle/>
+          <a:p>
+            <a:r>
+              <a:rPr lang="fr-FR" dirty="0"/>
+              <a:t>Projet personnel</a:t>
+            </a:r>
+          </a:p>
+        </p:txBody>
+      </p:sp>
+      <p:pic>
+        <p:nvPicPr>
+          <p:cNvPr id="4" name="Espace réservé du contenu 4">
+            <a:extLst>
+              <a:ext uri="{FF2B5EF4-FFF2-40B4-BE49-F238E27FC236}">
+                <a16:creationId xmlns:a16="http://schemas.microsoft.com/office/drawing/2014/main" id="{6BE7F347-8E6F-468F-B35A-4C9CF9A91ECD}"/>
+              </a:ext>
+            </a:extLst>
+          </p:cNvPr>
+          <p:cNvPicPr>
+            <a:picLocks noChangeAspect="1"/>
+          </p:cNvPicPr>
+          <p:nvPr/>
+        </p:nvPicPr>
+        <p:blipFill>
+          <a:blip r:embed="rId2" cstate="print">
+            <a:lum bright="70000" contrast="-70000"/>
+            <a:extLst>
+              <a:ext uri="{28A0092B-C50C-407E-A947-70E740481C1C}">
+                <a14:useLocalDpi xmlns:a14="http://schemas.microsoft.com/office/drawing/2010/main" val="0"/>
+              </a:ext>
+            </a:extLst>
+          </a:blip>
+          <a:stretch>
+            <a:fillRect/>
+          </a:stretch>
+        </p:blipFill>
+        <p:spPr>
+          <a:xfrm>
+            <a:off x="7499033" y="6318665"/>
+            <a:ext cx="616018" cy="616018"/>
+          </a:xfrm>
+          <a:prstGeom prst="rect">
+            <a:avLst/>
+          </a:prstGeom>
+        </p:spPr>
+      </p:pic>
+      <p:sp>
+        <p:nvSpPr>
+          <p:cNvPr id="5" name="ZoneTexte 4">
+            <a:extLst>
+              <a:ext uri="{FF2B5EF4-FFF2-40B4-BE49-F238E27FC236}">
+                <a16:creationId xmlns:a16="http://schemas.microsoft.com/office/drawing/2014/main" id="{ED9B02B8-4008-4EC6-A7A1-0DC6A64F1AB2}"/>
+              </a:ext>
+            </a:extLst>
+          </p:cNvPr>
+          <p:cNvSpPr txBox="1"/>
+          <p:nvPr/>
+        </p:nvSpPr>
+        <p:spPr>
+          <a:xfrm>
+            <a:off x="1693094" y="6442008"/>
+            <a:ext cx="1068371" cy="369332"/>
+          </a:xfrm>
+          <a:prstGeom prst="rect">
+            <a:avLst/>
+          </a:prstGeom>
+          <a:noFill/>
+        </p:spPr>
+        <p:txBody>
+          <a:bodyPr wrap="square" rtlCol="0">
+            <a:spAutoFit/>
+          </a:bodyPr>
+          <a:lstStyle/>
+          <a:p>
+            <a:pPr algn="just"/>
+            <a:r>
+              <a:rPr lang="fr-FR" dirty="0">
+                <a:solidFill>
+                  <a:schemeClr val="bg1"/>
+                </a:solidFill>
+                <a:latin typeface="Agency FB" panose="020B0503020202020204" pitchFamily="34" charset="0"/>
+              </a:rPr>
+              <a:t>Introduction</a:t>
+            </a:r>
+          </a:p>
+        </p:txBody>
+      </p:sp>
+      <p:sp>
+        <p:nvSpPr>
+          <p:cNvPr id="6" name="ZoneTexte 5">
+            <a:extLst>
+              <a:ext uri="{FF2B5EF4-FFF2-40B4-BE49-F238E27FC236}">
+                <a16:creationId xmlns:a16="http://schemas.microsoft.com/office/drawing/2014/main" id="{56A3C651-D503-4D2D-92D9-D818755649CA}"/>
+              </a:ext>
+            </a:extLst>
+          </p:cNvPr>
+          <p:cNvSpPr txBox="1"/>
+          <p:nvPr/>
+        </p:nvSpPr>
+        <p:spPr>
+          <a:xfrm>
+            <a:off x="3409930" y="6442008"/>
+            <a:ext cx="2107024" cy="369332"/>
+          </a:xfrm>
+          <a:prstGeom prst="rect">
+            <a:avLst/>
+          </a:prstGeom>
+          <a:noFill/>
+        </p:spPr>
+        <p:txBody>
+          <a:bodyPr wrap="square" rtlCol="0">
+            <a:spAutoFit/>
+          </a:bodyPr>
+          <a:lstStyle/>
+          <a:p>
+            <a:pPr algn="just"/>
+            <a:r>
+              <a:rPr lang="fr-FR" dirty="0">
+                <a:solidFill>
+                  <a:schemeClr val="bg1"/>
+                </a:solidFill>
+                <a:latin typeface="Agency FB" panose="020B0503020202020204" pitchFamily="34" charset="0"/>
+              </a:rPr>
+              <a:t>Présentation de PROXIDEJ</a:t>
+            </a:r>
+          </a:p>
+        </p:txBody>
+      </p:sp>
+      <p:sp>
+        <p:nvSpPr>
+          <p:cNvPr id="7" name="ZoneTexte 6">
+            <a:extLst>
+              <a:ext uri="{FF2B5EF4-FFF2-40B4-BE49-F238E27FC236}">
+                <a16:creationId xmlns:a16="http://schemas.microsoft.com/office/drawing/2014/main" id="{2A999787-6AF3-40AD-9F10-809786410FB5}"/>
+              </a:ext>
+            </a:extLst>
+          </p:cNvPr>
+          <p:cNvSpPr txBox="1"/>
+          <p:nvPr/>
+        </p:nvSpPr>
+        <p:spPr>
+          <a:xfrm>
+            <a:off x="6089564" y="6442008"/>
+            <a:ext cx="1409469" cy="369332"/>
+          </a:xfrm>
+          <a:prstGeom prst="rect">
+            <a:avLst/>
+          </a:prstGeom>
+          <a:noFill/>
+        </p:spPr>
+        <p:txBody>
+          <a:bodyPr wrap="square" rtlCol="0">
+            <a:spAutoFit/>
+          </a:bodyPr>
+          <a:lstStyle/>
+          <a:p>
+            <a:pPr algn="just"/>
+            <a:r>
+              <a:rPr lang="fr-FR" dirty="0">
+                <a:solidFill>
+                  <a:schemeClr val="bg1"/>
+                </a:solidFill>
+                <a:latin typeface="Agency FB" panose="020B0503020202020204" pitchFamily="34" charset="0"/>
+              </a:rPr>
+              <a:t>Projet en groupe</a:t>
+            </a:r>
+          </a:p>
+        </p:txBody>
+      </p:sp>
+      <p:sp>
+        <p:nvSpPr>
+          <p:cNvPr id="8" name="ZoneTexte 7">
+            <a:extLst>
+              <a:ext uri="{FF2B5EF4-FFF2-40B4-BE49-F238E27FC236}">
+                <a16:creationId xmlns:a16="http://schemas.microsoft.com/office/drawing/2014/main" id="{9AF224B5-A9FB-4843-840B-DF7AFA788510}"/>
+              </a:ext>
+            </a:extLst>
+          </p:cNvPr>
+          <p:cNvSpPr txBox="1"/>
+          <p:nvPr/>
+        </p:nvSpPr>
+        <p:spPr>
+          <a:xfrm>
+            <a:off x="8071644" y="6442008"/>
+            <a:ext cx="1409468" cy="369332"/>
+          </a:xfrm>
+          <a:prstGeom prst="rect">
+            <a:avLst/>
+          </a:prstGeom>
+          <a:noFill/>
+        </p:spPr>
+        <p:txBody>
+          <a:bodyPr wrap="square" rtlCol="0">
+            <a:spAutoFit/>
+          </a:bodyPr>
+          <a:lstStyle/>
+          <a:p>
+            <a:pPr algn="just"/>
+            <a:r>
+              <a:rPr lang="fr-FR" dirty="0">
+                <a:solidFill>
+                  <a:schemeClr val="bg1"/>
+                </a:solidFill>
+                <a:latin typeface="Agency FB" panose="020B0503020202020204" pitchFamily="34" charset="0"/>
+              </a:rPr>
+              <a:t>Projet personnel</a:t>
+            </a:r>
+          </a:p>
+        </p:txBody>
+      </p:sp>
+      <p:sp>
+        <p:nvSpPr>
+          <p:cNvPr id="9" name="ZoneTexte 8">
+            <a:extLst>
+              <a:ext uri="{FF2B5EF4-FFF2-40B4-BE49-F238E27FC236}">
+                <a16:creationId xmlns:a16="http://schemas.microsoft.com/office/drawing/2014/main" id="{F47E9ADC-3D8A-4C37-9C8A-7ABA36CA8C24}"/>
+              </a:ext>
+            </a:extLst>
+          </p:cNvPr>
+          <p:cNvSpPr txBox="1"/>
+          <p:nvPr/>
+        </p:nvSpPr>
+        <p:spPr>
+          <a:xfrm>
+            <a:off x="10053722" y="6442008"/>
+            <a:ext cx="1040998" cy="369332"/>
+          </a:xfrm>
+          <a:prstGeom prst="rect">
+            <a:avLst/>
+          </a:prstGeom>
+          <a:noFill/>
+        </p:spPr>
+        <p:txBody>
+          <a:bodyPr wrap="square" rtlCol="0">
+            <a:spAutoFit/>
+          </a:bodyPr>
+          <a:lstStyle/>
+          <a:p>
+            <a:pPr algn="just"/>
+            <a:r>
+              <a:rPr lang="fr-FR" dirty="0">
+                <a:solidFill>
+                  <a:schemeClr val="bg1"/>
+                </a:solidFill>
+                <a:latin typeface="Agency FB" panose="020B0503020202020204" pitchFamily="34" charset="0"/>
+              </a:rPr>
+              <a:t>Conclusion</a:t>
+            </a:r>
+          </a:p>
+        </p:txBody>
+      </p:sp>
+      <p:pic>
+        <p:nvPicPr>
+          <p:cNvPr id="11" name="Image 10" descr="Une image contenant horloge, mètre&#10;&#10;Description générée automatiquement">
+            <a:extLst>
+              <a:ext uri="{FF2B5EF4-FFF2-40B4-BE49-F238E27FC236}">
+                <a16:creationId xmlns:a16="http://schemas.microsoft.com/office/drawing/2014/main" id="{0386AF86-F998-4BB8-8D3C-4DED45D935C4}"/>
+              </a:ext>
+            </a:extLst>
+          </p:cNvPr>
+          <p:cNvPicPr>
+            <a:picLocks noChangeAspect="1"/>
+          </p:cNvPicPr>
+          <p:nvPr/>
+        </p:nvPicPr>
+        <p:blipFill>
+          <a:blip r:embed="rId3">
+            <a:extLst>
+              <a:ext uri="{28A0092B-C50C-407E-A947-70E740481C1C}">
+                <a14:useLocalDpi xmlns:a14="http://schemas.microsoft.com/office/drawing/2010/main" val="0"/>
+              </a:ext>
+            </a:extLst>
+          </a:blip>
+          <a:stretch>
+            <a:fillRect/>
+          </a:stretch>
+        </p:blipFill>
+        <p:spPr>
+          <a:xfrm>
+            <a:off x="4102417" y="2599262"/>
+            <a:ext cx="4048125" cy="2857500"/>
+          </a:xfrm>
+          <a:prstGeom prst="rect">
+            <a:avLst/>
+          </a:prstGeom>
+        </p:spPr>
+      </p:pic>
+    </p:spTree>
+    <p:extLst>
+      <p:ext uri="{BB962C8B-B14F-4D97-AF65-F5344CB8AC3E}">
+        <p14:creationId xmlns:p14="http://schemas.microsoft.com/office/powerpoint/2010/main" val="2474598549"/>
+      </p:ext>
+    </p:extLst>
+  </p:cSld>
+  <p:clrMapOvr>
+    <a:masterClrMapping/>
+  </p:clrMapOvr>
+  <mc:AlternateContent xmlns:mc="http://schemas.openxmlformats.org/markup-compatibility/2006" xmlns:p14="http://schemas.microsoft.com/office/powerpoint/2010/main">
+    <mc:Choice Requires="p14">
+      <p:transition spd="slow" p14:dur="2000">
+        <p:push dir="u"/>
+      </p:transition>
+    </mc:Choice>
+    <mc:Fallback xmlns="">
+      <p:transition spd="slow">
+        <p:push dir="u"/>
+      </p:transition>
+    </mc:Fallback>
+  </mc:AlternateContent>
+  <p:timing>
+    <p:tnLst>
+      <p:par>
+        <p:cTn id="1" dur="indefinite" restart="never" nodeType="tmRoot">
+          <p:childTnLst>
+            <p:seq concurrent="1" nextAc="seek">
+              <p:cTn id="2" dur="indefinite" nodeType="mainSeq">
+                <p:childTnLst>
+                  <p:par>
+                    <p:cTn id="3" fill="hold">
+                      <p:stCondLst>
+                        <p:cond delay="indefinite"/>
+                        <p:cond evt="onBegin" delay="0">
+                          <p:tn val="2"/>
+                        </p:cond>
+                      </p:stCondLst>
+                      <p:childTnLst>
+                        <p:par>
+                          <p:cTn id="4" fill="hold">
+                            <p:stCondLst>
+                              <p:cond delay="0"/>
+                            </p:stCondLst>
+                            <p:childTnLst>
+                              <p:par>
+                                <p:cTn id="5" presetID="10" presetClass="entr" presetSubtype="0" fill="hold" nodeType="withEffect">
+                                  <p:stCondLst>
+                                    <p:cond delay="0"/>
+                                  </p:stCondLst>
+                                  <p:childTnLst>
+                                    <p:set>
+                                      <p:cBhvr>
+                                        <p:cTn id="6" dur="1" fill="hold">
+                                          <p:stCondLst>
+                                            <p:cond delay="0"/>
+                                          </p:stCondLst>
+                                        </p:cTn>
+                                        <p:tgtEl>
+                                          <p:spTgt spid="11"/>
+                                        </p:tgtEl>
+                                        <p:attrNameLst>
+                                          <p:attrName>style.visibility</p:attrName>
+                                        </p:attrNameLst>
+                                      </p:cBhvr>
+                                      <p:to>
+                                        <p:strVal val="visible"/>
+                                      </p:to>
+                                    </p:set>
+                                    <p:animEffect transition="in" filter="fade">
+                                      <p:cBhvr>
+                                        <p:cTn id="7" dur="500"/>
+                                        <p:tgtEl>
+                                          <p:spTgt spid="11"/>
+                                        </p:tgtEl>
+                                      </p:cBhvr>
+                                    </p:animEffect>
+                                  </p:childTnLst>
+                                </p:cTn>
+                              </p:par>
+                            </p:childTnLst>
+                          </p:cTn>
+                        </p:par>
+                      </p:childTnLst>
+                    </p:cTn>
+                  </p:par>
+                </p:childTnLst>
+              </p:cTn>
+              <p:prevCondLst>
+                <p:cond evt="onPrev" delay="0">
+                  <p:tgtEl>
+                    <p:sldTgt/>
+                  </p:tgtEl>
+                </p:cond>
+              </p:prevCondLst>
+              <p:nextCondLst>
+                <p:cond evt="onNext" delay="0">
+                  <p:tgtEl>
+                    <p:sldTgt/>
+                  </p:tgtEl>
+                </p:cond>
+              </p:nextCondLst>
+            </p:seq>
+          </p:childTnLst>
+        </p:cTn>
+      </p:par>
+    </p:tnLst>
+  </p:timing>
+</p:sld>
+</file>
+
+<file path=ppt/slides/slide16.xml><?xml version="1.0" encoding="utf-8"?>
 <p:sld xmlns:a="http://schemas.openxmlformats.org/drawingml/2006/main" xmlns:r="http://schemas.openxmlformats.org/officeDocument/2006/relationships" xmlns:p="http://schemas.openxmlformats.org/presentationml/2006/main">
   <p:cSld>
     <p:spTree>
@@ -10521,9 +11317,18 @@
   <p:clrMapOvr>
     <a:masterClrMapping/>
   </p:clrMapOvr>
-  <p:transition spd="slow">
-    <p:push dir="u"/>
-  </p:transition>
+  <mc:AlternateContent xmlns:mc="http://schemas.openxmlformats.org/markup-compatibility/2006" xmlns:p14="http://schemas.microsoft.com/office/powerpoint/2010/main">
+    <mc:Choice Requires="p14">
+      <p:transition spd="slow" p14:dur="2000">
+        <p:push dir="u"/>
+      </p:transition>
+    </mc:Choice>
+    <mc:Fallback xmlns="">
+      <p:transition spd="slow">
+        <p:push dir="u"/>
+      </p:transition>
+    </mc:Fallback>
+  </mc:AlternateContent>
   <p:timing>
     <p:tnLst>
       <p:par>
@@ -10719,13 +11524,13 @@
   <p:clrMapOvr>
     <a:masterClrMapping/>
   </p:clrMapOvr>
-  <mc:AlternateContent xmlns:mc="http://schemas.openxmlformats.org/markup-compatibility/2006">
-    <mc:Choice xmlns:p14="http://schemas.microsoft.com/office/powerpoint/2010/main" Requires="p14">
+  <mc:AlternateContent xmlns:mc="http://schemas.openxmlformats.org/markup-compatibility/2006" xmlns:p14="http://schemas.microsoft.com/office/powerpoint/2010/main">
+    <mc:Choice Requires="p14">
       <p:transition spd="slow" p14:dur="2000">
         <p:push dir="u"/>
       </p:transition>
     </mc:Choice>
-    <mc:Fallback>
+    <mc:Fallback xmlns="">
       <p:transition spd="slow">
         <p:push dir="u"/>
       </p:transition>
@@ -11304,13 +12109,13 @@
   <p:clrMapOvr>
     <a:masterClrMapping/>
   </p:clrMapOvr>
-  <mc:AlternateContent xmlns:mc="http://schemas.openxmlformats.org/markup-compatibility/2006">
-    <mc:Choice xmlns:p14="http://schemas.microsoft.com/office/powerpoint/2010/main" Requires="p14">
+  <mc:AlternateContent xmlns:mc="http://schemas.openxmlformats.org/markup-compatibility/2006" xmlns:p14="http://schemas.microsoft.com/office/powerpoint/2010/main">
+    <mc:Choice Requires="p14">
       <p:transition spd="slow" p14:dur="2000">
         <p:push dir="u"/>
       </p:transition>
     </mc:Choice>
-    <mc:Fallback>
+    <mc:Fallback xmlns="">
       <p:transition spd="slow">
         <p:push dir="u"/>
       </p:transition>
@@ -11966,9 +12771,614 @@
   <p:clrMapOvr>
     <a:masterClrMapping/>
   </p:clrMapOvr>
+  <mc:AlternateContent xmlns:mc="http://schemas.openxmlformats.org/markup-compatibility/2006" xmlns:p14="http://schemas.microsoft.com/office/powerpoint/2010/main">
+    <mc:Choice Requires="p14">
+      <p:transition p14:dur="0"/>
+    </mc:Choice>
+    <mc:Fallback xmlns="">
+      <p:transition/>
+    </mc:Fallback>
+  </mc:AlternateContent>
+  <p:timing>
+    <p:tnLst>
+      <p:par>
+        <p:cTn id="1" dur="indefinite" restart="never" nodeType="tmRoot">
+          <p:childTnLst>
+            <p:seq concurrent="1" nextAc="seek">
+              <p:cTn id="2" dur="indefinite" nodeType="mainSeq">
+                <p:childTnLst>
+                  <p:par>
+                    <p:cTn id="3" fill="hold">
+                      <p:stCondLst>
+                        <p:cond delay="indefinite"/>
+                        <p:cond evt="onBegin" delay="0">
+                          <p:tn val="2"/>
+                        </p:cond>
+                      </p:stCondLst>
+                      <p:childTnLst>
+                        <p:par>
+                          <p:cTn id="4" fill="hold">
+                            <p:stCondLst>
+                              <p:cond delay="0"/>
+                            </p:stCondLst>
+                            <p:childTnLst>
+                              <p:par>
+                                <p:cTn id="5" presetID="10" presetClass="entr" presetSubtype="0" fill="hold" nodeType="withEffect">
+                                  <p:stCondLst>
+                                    <p:cond delay="0"/>
+                                  </p:stCondLst>
+                                  <p:childTnLst>
+                                    <p:set>
+                                      <p:cBhvr>
+                                        <p:cTn id="6" dur="1" fill="hold">
+                                          <p:stCondLst>
+                                            <p:cond delay="0"/>
+                                          </p:stCondLst>
+                                        </p:cTn>
+                                        <p:tgtEl>
+                                          <p:spTgt spid="14"/>
+                                        </p:tgtEl>
+                                        <p:attrNameLst>
+                                          <p:attrName>style.visibility</p:attrName>
+                                        </p:attrNameLst>
+                                      </p:cBhvr>
+                                      <p:to>
+                                        <p:strVal val="visible"/>
+                                      </p:to>
+                                    </p:set>
+                                    <p:animEffect transition="in" filter="fade">
+                                      <p:cBhvr>
+                                        <p:cTn id="7" dur="500"/>
+                                        <p:tgtEl>
+                                          <p:spTgt spid="14"/>
+                                        </p:tgtEl>
+                                      </p:cBhvr>
+                                    </p:animEffect>
+                                  </p:childTnLst>
+                                </p:cTn>
+                              </p:par>
+                            </p:childTnLst>
+                          </p:cTn>
+                        </p:par>
+                      </p:childTnLst>
+                    </p:cTn>
+                  </p:par>
+                </p:childTnLst>
+              </p:cTn>
+              <p:prevCondLst>
+                <p:cond evt="onPrev" delay="0">
+                  <p:tgtEl>
+                    <p:sldTgt/>
+                  </p:tgtEl>
+                </p:cond>
+              </p:prevCondLst>
+              <p:nextCondLst>
+                <p:cond evt="onNext" delay="0">
+                  <p:tgtEl>
+                    <p:sldTgt/>
+                  </p:tgtEl>
+                </p:cond>
+              </p:nextCondLst>
+            </p:seq>
+          </p:childTnLst>
+        </p:cTn>
+      </p:par>
+    </p:tnLst>
+  </p:timing>
+</p:sld>
+</file>
+
+<file path=ppt/slides/slide5.xml><?xml version="1.0" encoding="utf-8"?>
+<p:sld xmlns:a="http://schemas.openxmlformats.org/drawingml/2006/main" xmlns:r="http://schemas.openxmlformats.org/officeDocument/2006/relationships" xmlns:p="http://schemas.openxmlformats.org/presentationml/2006/main">
+  <p:cSld>
+    <p:spTree>
+      <p:nvGrpSpPr>
+        <p:cNvPr id="1" name=""/>
+        <p:cNvGrpSpPr/>
+        <p:nvPr/>
+      </p:nvGrpSpPr>
+      <p:grpSpPr>
+        <a:xfrm>
+          <a:off x="0" y="0"/>
+          <a:ext cx="0" cy="0"/>
+          <a:chOff x="0" y="0"/>
+          <a:chExt cx="0" cy="0"/>
+        </a:xfrm>
+      </p:grpSpPr>
+      <p:pic>
+        <p:nvPicPr>
+          <p:cNvPr id="14" name="Image 13">
+            <a:extLst>
+              <a:ext uri="{FF2B5EF4-FFF2-40B4-BE49-F238E27FC236}">
+                <a16:creationId xmlns:a16="http://schemas.microsoft.com/office/drawing/2014/main" id="{2BAA4FAF-1917-49A2-93AD-853EDBDE6C5C}"/>
+              </a:ext>
+            </a:extLst>
+          </p:cNvPr>
+          <p:cNvPicPr>
+            <a:picLocks noChangeAspect="1"/>
+          </p:cNvPicPr>
+          <p:nvPr/>
+        </p:nvPicPr>
+        <p:blipFill rotWithShape="1">
+          <a:blip r:embed="rId2"/>
+          <a:srcRect l="29698" t="6255"/>
+          <a:stretch/>
+        </p:blipFill>
+        <p:spPr>
+          <a:xfrm>
+            <a:off x="7545924" y="2341377"/>
+            <a:ext cx="3070126" cy="2597184"/>
+          </a:xfrm>
+          <a:prstGeom prst="rect">
+            <a:avLst/>
+          </a:prstGeom>
+        </p:spPr>
+      </p:pic>
+      <p:sp>
+        <p:nvSpPr>
+          <p:cNvPr id="2" name="Titre 1">
+            <a:extLst>
+              <a:ext uri="{FF2B5EF4-FFF2-40B4-BE49-F238E27FC236}">
+                <a16:creationId xmlns:a16="http://schemas.microsoft.com/office/drawing/2014/main" id="{5AE590CB-4D4D-4628-B8A0-CF8C0DAF4B3C}"/>
+              </a:ext>
+            </a:extLst>
+          </p:cNvPr>
+          <p:cNvSpPr>
+            <a:spLocks noGrp="1"/>
+          </p:cNvSpPr>
+          <p:nvPr>
+            <p:ph type="title"/>
+          </p:nvPr>
+        </p:nvSpPr>
+        <p:spPr/>
+        <p:txBody>
+          <a:bodyPr/>
+          <a:lstStyle/>
+          <a:p>
+            <a:r>
+              <a:rPr lang="fr-FR">
+                <a:ln>
+                  <a:solidFill>
+                    <a:srgbClr val="000000">
+                      <a:lumMod val="75000"/>
+                      <a:lumOff val="25000"/>
+                      <a:alpha val="10000"/>
+                    </a:srgbClr>
+                  </a:solidFill>
+                </a:ln>
+                <a:effectLst>
+                  <a:outerShdw blurRad="9525" dist="25400" dir="14640000" algn="tl" rotWithShape="0">
+                    <a:srgbClr val="000000">
+                      <a:alpha val="30000"/>
+                    </a:srgbClr>
+                  </a:outerShdw>
+                </a:effectLst>
+              </a:rPr>
+              <a:t>Introduction</a:t>
+            </a:r>
+            <a:endParaRPr lang="fr-FR"/>
+          </a:p>
+        </p:txBody>
+      </p:sp>
+      <p:pic>
+        <p:nvPicPr>
+          <p:cNvPr id="8" name="Image 7" descr="Une image contenant dessin&#10;&#10;Description générée automatiquement">
+            <a:extLst>
+              <a:ext uri="{FF2B5EF4-FFF2-40B4-BE49-F238E27FC236}">
+                <a16:creationId xmlns:a16="http://schemas.microsoft.com/office/drawing/2014/main" id="{4128002E-7732-4E43-B41A-452E2EA1F374}"/>
+              </a:ext>
+            </a:extLst>
+          </p:cNvPr>
+          <p:cNvPicPr>
+            <a:picLocks noChangeAspect="1"/>
+          </p:cNvPicPr>
+          <p:nvPr/>
+        </p:nvPicPr>
+        <p:blipFill>
+          <a:blip r:embed="rId3">
+            <a:extLst>
+              <a:ext uri="{28A0092B-C50C-407E-A947-70E740481C1C}">
+                <a14:useLocalDpi xmlns:a14="http://schemas.microsoft.com/office/drawing/2010/main" val="0"/>
+              </a:ext>
+            </a:extLst>
+          </a:blip>
+          <a:stretch>
+            <a:fillRect/>
+          </a:stretch>
+        </p:blipFill>
+        <p:spPr>
+          <a:xfrm>
+            <a:off x="593256" y="3486150"/>
+            <a:ext cx="2381250" cy="828675"/>
+          </a:xfrm>
+          <a:prstGeom prst="rect">
+            <a:avLst/>
+          </a:prstGeom>
+        </p:spPr>
+      </p:pic>
+      <p:grpSp>
+        <p:nvGrpSpPr>
+          <p:cNvPr id="13" name="Groupe 12">
+            <a:extLst>
+              <a:ext uri="{FF2B5EF4-FFF2-40B4-BE49-F238E27FC236}">
+                <a16:creationId xmlns:a16="http://schemas.microsoft.com/office/drawing/2014/main" id="{C70AB5FA-D9CC-49BF-8FC8-39D1A3A2B1FC}"/>
+              </a:ext>
+            </a:extLst>
+          </p:cNvPr>
+          <p:cNvGrpSpPr/>
+          <p:nvPr/>
+        </p:nvGrpSpPr>
+        <p:grpSpPr>
+          <a:xfrm>
+            <a:off x="3438762" y="2627521"/>
+            <a:ext cx="3467736" cy="2699489"/>
+            <a:chOff x="4202160" y="2600325"/>
+            <a:chExt cx="2667000" cy="2076149"/>
+          </a:xfrm>
+        </p:grpSpPr>
+        <p:pic>
+          <p:nvPicPr>
+            <p:cNvPr id="10" name="Image 9" descr="Une image contenant route, extérieur, bâtiment, camion&#10;&#10;Description générée automatiquement">
+              <a:extLst>
+                <a:ext uri="{FF2B5EF4-FFF2-40B4-BE49-F238E27FC236}">
+                  <a16:creationId xmlns:a16="http://schemas.microsoft.com/office/drawing/2014/main" id="{49D8A589-BE69-4F23-8AF1-0FC38B74038D}"/>
+                </a:ext>
+              </a:extLst>
+            </p:cNvPr>
+            <p:cNvPicPr>
+              <a:picLocks noChangeAspect="1"/>
+            </p:cNvPicPr>
+            <p:nvPr/>
+          </p:nvPicPr>
+          <p:blipFill>
+            <a:blip r:embed="rId4">
+              <a:extLst>
+                <a:ext uri="{28A0092B-C50C-407E-A947-70E740481C1C}">
+                  <a14:useLocalDpi xmlns:a14="http://schemas.microsoft.com/office/drawing/2010/main" val="0"/>
+                </a:ext>
+              </a:extLst>
+            </a:blip>
+            <a:stretch>
+              <a:fillRect/>
+            </a:stretch>
+          </p:blipFill>
+          <p:spPr>
+            <a:xfrm>
+              <a:off x="4202160" y="2600325"/>
+              <a:ext cx="1333500" cy="885825"/>
+            </a:xfrm>
+            <a:prstGeom prst="rect">
+              <a:avLst/>
+            </a:prstGeom>
+          </p:spPr>
+        </p:pic>
+        <p:pic>
+          <p:nvPicPr>
+            <p:cNvPr id="11" name="Image 10" descr="Une image contenant route, extérieur, bâtiment, camion&#10;&#10;Description générée automatiquement">
+              <a:extLst>
+                <a:ext uri="{FF2B5EF4-FFF2-40B4-BE49-F238E27FC236}">
+                  <a16:creationId xmlns:a16="http://schemas.microsoft.com/office/drawing/2014/main" id="{8790C4D0-F91F-480C-8878-BF55803612D5}"/>
+                </a:ext>
+              </a:extLst>
+            </p:cNvPr>
+            <p:cNvPicPr>
+              <a:picLocks noChangeAspect="1"/>
+            </p:cNvPicPr>
+            <p:nvPr/>
+          </p:nvPicPr>
+          <p:blipFill>
+            <a:blip r:embed="rId4">
+              <a:extLst>
+                <a:ext uri="{28A0092B-C50C-407E-A947-70E740481C1C}">
+                  <a14:useLocalDpi xmlns:a14="http://schemas.microsoft.com/office/drawing/2010/main" val="0"/>
+                </a:ext>
+              </a:extLst>
+            </a:blip>
+            <a:stretch>
+              <a:fillRect/>
+            </a:stretch>
+          </p:blipFill>
+          <p:spPr>
+            <a:xfrm>
+              <a:off x="4762500" y="3195487"/>
+              <a:ext cx="1333500" cy="885825"/>
+            </a:xfrm>
+            <a:prstGeom prst="rect">
+              <a:avLst/>
+            </a:prstGeom>
+          </p:spPr>
+        </p:pic>
+        <p:pic>
+          <p:nvPicPr>
+            <p:cNvPr id="12" name="Image 11" descr="Une image contenant route, extérieur, bâtiment, camion&#10;&#10;Description générée automatiquement">
+              <a:extLst>
+                <a:ext uri="{FF2B5EF4-FFF2-40B4-BE49-F238E27FC236}">
+                  <a16:creationId xmlns:a16="http://schemas.microsoft.com/office/drawing/2014/main" id="{2E302D75-C2DF-42FB-BA74-F2430E7C158E}"/>
+                </a:ext>
+              </a:extLst>
+            </p:cNvPr>
+            <p:cNvPicPr>
+              <a:picLocks noChangeAspect="1"/>
+            </p:cNvPicPr>
+            <p:nvPr/>
+          </p:nvPicPr>
+          <p:blipFill>
+            <a:blip r:embed="rId4">
+              <a:extLst>
+                <a:ext uri="{28A0092B-C50C-407E-A947-70E740481C1C}">
+                  <a14:useLocalDpi xmlns:a14="http://schemas.microsoft.com/office/drawing/2010/main" val="0"/>
+                </a:ext>
+              </a:extLst>
+            </a:blip>
+            <a:stretch>
+              <a:fillRect/>
+            </a:stretch>
+          </p:blipFill>
+          <p:spPr>
+            <a:xfrm>
+              <a:off x="5535660" y="3790649"/>
+              <a:ext cx="1333500" cy="885825"/>
+            </a:xfrm>
+            <a:prstGeom prst="rect">
+              <a:avLst/>
+            </a:prstGeom>
+          </p:spPr>
+        </p:pic>
+      </p:grpSp>
+      <p:pic>
+        <p:nvPicPr>
+          <p:cNvPr id="9" name="Espace réservé du contenu 4">
+            <a:extLst>
+              <a:ext uri="{FF2B5EF4-FFF2-40B4-BE49-F238E27FC236}">
+                <a16:creationId xmlns:a16="http://schemas.microsoft.com/office/drawing/2014/main" id="{265D5BD5-909E-4B41-BCD2-9C53423C99B9}"/>
+              </a:ext>
+            </a:extLst>
+          </p:cNvPr>
+          <p:cNvPicPr>
+            <a:picLocks noGrp="1" noChangeAspect="1"/>
+          </p:cNvPicPr>
+          <p:nvPr>
+            <p:ph idx="1"/>
+          </p:nvPr>
+        </p:nvPicPr>
+        <p:blipFill>
+          <a:blip r:embed="rId5" cstate="print">
+            <a:lum bright="70000" contrast="-70000"/>
+            <a:extLst>
+              <a:ext uri="{28A0092B-C50C-407E-A947-70E740481C1C}">
+                <a14:useLocalDpi xmlns:a14="http://schemas.microsoft.com/office/drawing/2010/main" val="0"/>
+              </a:ext>
+            </a:extLst>
+          </a:blip>
+          <a:stretch>
+            <a:fillRect/>
+          </a:stretch>
+        </p:blipFill>
+        <p:spPr>
+          <a:xfrm>
+            <a:off x="1077076" y="6318665"/>
+            <a:ext cx="616018" cy="616018"/>
+          </a:xfrm>
+        </p:spPr>
+      </p:pic>
+      <p:sp>
+        <p:nvSpPr>
+          <p:cNvPr id="15" name="ZoneTexte 14">
+            <a:extLst>
+              <a:ext uri="{FF2B5EF4-FFF2-40B4-BE49-F238E27FC236}">
+                <a16:creationId xmlns:a16="http://schemas.microsoft.com/office/drawing/2014/main" id="{8A5CB48D-E055-48EA-9A03-1B8D7236212F}"/>
+              </a:ext>
+            </a:extLst>
+          </p:cNvPr>
+          <p:cNvSpPr txBox="1"/>
+          <p:nvPr/>
+        </p:nvSpPr>
+        <p:spPr>
+          <a:xfrm>
+            <a:off x="1693094" y="6442008"/>
+            <a:ext cx="1068371" cy="369332"/>
+          </a:xfrm>
+          <a:prstGeom prst="rect">
+            <a:avLst/>
+          </a:prstGeom>
+          <a:noFill/>
+        </p:spPr>
+        <p:txBody>
+          <a:bodyPr wrap="square" rtlCol="0">
+            <a:spAutoFit/>
+          </a:bodyPr>
+          <a:lstStyle/>
+          <a:p>
+            <a:pPr algn="just"/>
+            <a:r>
+              <a:rPr lang="fr-FR" dirty="0">
+                <a:solidFill>
+                  <a:schemeClr val="bg1"/>
+                </a:solidFill>
+                <a:latin typeface="Agency FB" panose="020B0503020202020204" pitchFamily="34" charset="0"/>
+              </a:rPr>
+              <a:t>Introduction</a:t>
+            </a:r>
+          </a:p>
+        </p:txBody>
+      </p:sp>
+      <p:sp>
+        <p:nvSpPr>
+          <p:cNvPr id="16" name="ZoneTexte 15">
+            <a:extLst>
+              <a:ext uri="{FF2B5EF4-FFF2-40B4-BE49-F238E27FC236}">
+                <a16:creationId xmlns:a16="http://schemas.microsoft.com/office/drawing/2014/main" id="{66081493-C009-4CBE-980A-97A52AB3D575}"/>
+              </a:ext>
+            </a:extLst>
+          </p:cNvPr>
+          <p:cNvSpPr txBox="1"/>
+          <p:nvPr/>
+        </p:nvSpPr>
+        <p:spPr>
+          <a:xfrm>
+            <a:off x="3409929" y="6442008"/>
+            <a:ext cx="2107025" cy="369332"/>
+          </a:xfrm>
+          <a:prstGeom prst="rect">
+            <a:avLst/>
+          </a:prstGeom>
+          <a:noFill/>
+        </p:spPr>
+        <p:txBody>
+          <a:bodyPr wrap="square" rtlCol="0">
+            <a:spAutoFit/>
+          </a:bodyPr>
+          <a:lstStyle/>
+          <a:p>
+            <a:pPr algn="just"/>
+            <a:r>
+              <a:rPr lang="fr-FR" dirty="0">
+                <a:solidFill>
+                  <a:schemeClr val="bg1"/>
+                </a:solidFill>
+                <a:latin typeface="Agency FB" panose="020B0503020202020204" pitchFamily="34" charset="0"/>
+              </a:rPr>
+              <a:t>Présentation de PROXIDEJ</a:t>
+            </a:r>
+          </a:p>
+        </p:txBody>
+      </p:sp>
+      <p:sp>
+        <p:nvSpPr>
+          <p:cNvPr id="17" name="ZoneTexte 16">
+            <a:extLst>
+              <a:ext uri="{FF2B5EF4-FFF2-40B4-BE49-F238E27FC236}">
+                <a16:creationId xmlns:a16="http://schemas.microsoft.com/office/drawing/2014/main" id="{9DC7B766-D431-429A-9C44-131B8443066B}"/>
+              </a:ext>
+            </a:extLst>
+          </p:cNvPr>
+          <p:cNvSpPr txBox="1"/>
+          <p:nvPr/>
+        </p:nvSpPr>
+        <p:spPr>
+          <a:xfrm>
+            <a:off x="6089564" y="6442008"/>
+            <a:ext cx="1409469" cy="369332"/>
+          </a:xfrm>
+          <a:prstGeom prst="rect">
+            <a:avLst/>
+          </a:prstGeom>
+          <a:noFill/>
+        </p:spPr>
+        <p:txBody>
+          <a:bodyPr wrap="square" rtlCol="0">
+            <a:spAutoFit/>
+          </a:bodyPr>
+          <a:lstStyle/>
+          <a:p>
+            <a:pPr algn="just"/>
+            <a:r>
+              <a:rPr lang="fr-FR" dirty="0">
+                <a:solidFill>
+                  <a:schemeClr val="bg1"/>
+                </a:solidFill>
+                <a:latin typeface="Agency FB" panose="020B0503020202020204" pitchFamily="34" charset="0"/>
+              </a:rPr>
+              <a:t>Projet en groupe</a:t>
+            </a:r>
+          </a:p>
+        </p:txBody>
+      </p:sp>
+      <p:sp>
+        <p:nvSpPr>
+          <p:cNvPr id="18" name="ZoneTexte 17">
+            <a:extLst>
+              <a:ext uri="{FF2B5EF4-FFF2-40B4-BE49-F238E27FC236}">
+                <a16:creationId xmlns:a16="http://schemas.microsoft.com/office/drawing/2014/main" id="{ED65F325-4B0A-4F40-B53F-943C243EA84A}"/>
+              </a:ext>
+            </a:extLst>
+          </p:cNvPr>
+          <p:cNvSpPr txBox="1"/>
+          <p:nvPr/>
+        </p:nvSpPr>
+        <p:spPr>
+          <a:xfrm>
+            <a:off x="8071644" y="6442008"/>
+            <a:ext cx="1409468" cy="369332"/>
+          </a:xfrm>
+          <a:prstGeom prst="rect">
+            <a:avLst/>
+          </a:prstGeom>
+          <a:noFill/>
+        </p:spPr>
+        <p:txBody>
+          <a:bodyPr wrap="square" rtlCol="0">
+            <a:spAutoFit/>
+          </a:bodyPr>
+          <a:lstStyle/>
+          <a:p>
+            <a:pPr algn="just"/>
+            <a:r>
+              <a:rPr lang="fr-FR" dirty="0">
+                <a:solidFill>
+                  <a:schemeClr val="bg1"/>
+                </a:solidFill>
+                <a:latin typeface="Agency FB" panose="020B0503020202020204" pitchFamily="34" charset="0"/>
+              </a:rPr>
+              <a:t>Projet personnel</a:t>
+            </a:r>
+          </a:p>
+        </p:txBody>
+      </p:sp>
+      <p:sp>
+        <p:nvSpPr>
+          <p:cNvPr id="19" name="ZoneTexte 18">
+            <a:extLst>
+              <a:ext uri="{FF2B5EF4-FFF2-40B4-BE49-F238E27FC236}">
+                <a16:creationId xmlns:a16="http://schemas.microsoft.com/office/drawing/2014/main" id="{B9836F88-72B5-41C1-98A0-BE1514F0A098}"/>
+              </a:ext>
+            </a:extLst>
+          </p:cNvPr>
+          <p:cNvSpPr txBox="1"/>
+          <p:nvPr/>
+        </p:nvSpPr>
+        <p:spPr>
+          <a:xfrm>
+            <a:off x="10053722" y="6442008"/>
+            <a:ext cx="1040998" cy="369332"/>
+          </a:xfrm>
+          <a:prstGeom prst="rect">
+            <a:avLst/>
+          </a:prstGeom>
+          <a:noFill/>
+        </p:spPr>
+        <p:txBody>
+          <a:bodyPr wrap="square" rtlCol="0">
+            <a:spAutoFit/>
+          </a:bodyPr>
+          <a:lstStyle/>
+          <a:p>
+            <a:pPr algn="just"/>
+            <a:r>
+              <a:rPr lang="fr-FR" dirty="0">
+                <a:solidFill>
+                  <a:schemeClr val="bg1"/>
+                </a:solidFill>
+                <a:latin typeface="Agency FB" panose="020B0503020202020204" pitchFamily="34" charset="0"/>
+              </a:rPr>
+              <a:t>Conclusion</a:t>
+            </a:r>
+          </a:p>
+        </p:txBody>
+      </p:sp>
+    </p:spTree>
+    <p:extLst>
+      <p:ext uri="{BB962C8B-B14F-4D97-AF65-F5344CB8AC3E}">
+        <p14:creationId xmlns:p14="http://schemas.microsoft.com/office/powerpoint/2010/main" val="60780924"/>
+      </p:ext>
+    </p:extLst>
+  </p:cSld>
+  <p:clrMapOvr>
+    <a:masterClrMapping/>
+  </p:clrMapOvr>
   <mc:AlternateContent xmlns:mc="http://schemas.openxmlformats.org/markup-compatibility/2006">
     <mc:Choice xmlns:p14="http://schemas.microsoft.com/office/powerpoint/2010/main" Requires="p14">
-      <p:transition p14:dur="0"/>
+      <p:transition p14:dur="10"/>
     </mc:Choice>
     <mc:Fallback>
       <p:transition/>
@@ -12019,33 +13429,6 @@
                                   </p:childTnLst>
                                 </p:cTn>
                               </p:par>
-                              <p:par>
-                                <p:cTn id="7" presetID="1" presetClass="entr" presetSubtype="0" fill="hold" nodeType="withEffect">
-                                  <p:stCondLst>
-                                    <p:cond delay="0"/>
-                                  </p:stCondLst>
-                                  <p:childTnLst>
-                                    <p:set>
-                                      <p:cBhvr>
-                                        <p:cTn id="8" dur="1" fill="hold">
-                                          <p:stCondLst>
-                                            <p:cond delay="0"/>
-                                          </p:stCondLst>
-                                        </p:cTn>
-                                        <p:tgtEl>
-                                          <p:spTgt spid="14"/>
-                                        </p:tgtEl>
-                                        <p:attrNameLst>
-                                          <p:attrName>style.visibility</p:attrName>
-                                        </p:attrNameLst>
-                                      </p:cBhvr>
-                                      <p:to>
-                                        <p:strVal val="visible"/>
-                                      </p:to>
-                                    </p:set>
-                                  </p:childTnLst>
-                                </p:cTn>
-                              </p:par>
                             </p:childTnLst>
                           </p:cTn>
                         </p:par>
@@ -12077,7 +13460,7 @@
 </p:sld>
 </file>
 
-<file path=ppt/slides/slide5.xml><?xml version="1.0" encoding="utf-8"?>
+<file path=ppt/slides/slide6.xml><?xml version="1.0" encoding="utf-8"?>
 <p:sld xmlns:a="http://schemas.openxmlformats.org/drawingml/2006/main" xmlns:r="http://schemas.openxmlformats.org/officeDocument/2006/relationships" xmlns:p="http://schemas.openxmlformats.org/presentationml/2006/main">
   <p:cSld>
     <p:bg>
@@ -12356,7 +13739,7 @@
           <a:lstStyle/>
           <a:p>
             <a:r>
-              <a:rPr lang="en-US" sz="5100">
+              <a:rPr lang="en-US" sz="5100" dirty="0">
                 <a:solidFill>
                   <a:schemeClr val="tx1">
                     <a:lumMod val="85000"/>
@@ -12533,47 +13916,6 @@
           </a:fontRef>
         </p:style>
       </p:sp>
-      <p:sp>
-        <p:nvSpPr>
-          <p:cNvPr id="5" name="ZoneTexte 4">
-            <a:extLst>
-              <a:ext uri="{FF2B5EF4-FFF2-40B4-BE49-F238E27FC236}">
-                <a16:creationId xmlns:a16="http://schemas.microsoft.com/office/drawing/2014/main" id="{C36FCC54-CDEB-4891-96C5-4DC747AD8D98}"/>
-              </a:ext>
-            </a:extLst>
-          </p:cNvPr>
-          <p:cNvSpPr txBox="1"/>
-          <p:nvPr/>
-        </p:nvSpPr>
-        <p:spPr>
-          <a:xfrm>
-            <a:off x="1696441" y="2281589"/>
-            <a:ext cx="2263761" cy="369332"/>
-          </a:xfrm>
-          <a:prstGeom prst="rect">
-            <a:avLst/>
-          </a:prstGeom>
-          <a:noFill/>
-        </p:spPr>
-        <p:txBody>
-          <a:bodyPr wrap="none" rtlCol="0">
-            <a:spAutoFit/>
-          </a:bodyPr>
-          <a:lstStyle/>
-          <a:p>
-            <a:pPr>
-              <a:spcAft>
-                <a:spcPts val="600"/>
-              </a:spcAft>
-            </a:pPr>
-            <a:r>
-              <a:rPr lang="fr-FR" dirty="0"/>
-              <a:t>Consigne de stockage</a:t>
-            </a:r>
-            <a:endParaRPr lang="fr-FR"/>
-          </a:p>
-        </p:txBody>
-      </p:sp>
       <p:graphicFrame>
         <p:nvGraphicFramePr>
           <p:cNvPr id="3" name="Tableau 3">
@@ -12589,14 +13931,14 @@
           <p:nvPr>
             <p:extLst>
               <p:ext uri="{D42A27DB-BD31-4B8C-83A1-F6EECF244321}">
-                <p14:modId xmlns:p14="http://schemas.microsoft.com/office/powerpoint/2010/main" val="68253416"/>
+                <p14:modId xmlns:p14="http://schemas.microsoft.com/office/powerpoint/2010/main" val="800079112"/>
               </p:ext>
             </p:extLst>
           </p:nvPr>
         </p:nvGraphicFramePr>
         <p:xfrm>
-          <a:off x="886345" y="640081"/>
-          <a:ext cx="6407526" cy="5054161"/>
+          <a:off x="1015068" y="638631"/>
+          <a:ext cx="6278802" cy="4952624"/>
         </p:xfrm>
         <a:graphic>
           <a:graphicData uri="http://schemas.openxmlformats.org/drawingml/2006/table">
@@ -12605,14 +13947,14 @@
                 <a:tableStyleId>{5C22544A-7EE6-4342-B048-85BDC9FD1C3A}</a:tableStyleId>
               </a:tblPr>
               <a:tblGrid>
-                <a:gridCol w="3688581">
+                <a:gridCol w="3614479">
                   <a:extLst>
                     <a:ext uri="{9D8B030D-6E8A-4147-A177-3AD203B41FA5}">
                       <a16:colId xmlns:a16="http://schemas.microsoft.com/office/drawing/2014/main" val="3767668144"/>
                     </a:ext>
                   </a:extLst>
                 </a:gridCol>
-                <a:gridCol w="2718945">
+                <a:gridCol w="2664323">
                   <a:extLst>
                     <a:ext uri="{9D8B030D-6E8A-4147-A177-3AD203B41FA5}">
                       <a16:colId xmlns:a16="http://schemas.microsoft.com/office/drawing/2014/main" val="1705234598"/>
@@ -12620,19 +13962,19 @@
                   </a:extLst>
                 </a:gridCol>
               </a:tblGrid>
-              <a:tr h="722023">
+              <a:tr h="707518">
                 <a:tc>
                   <a:txBody>
                     <a:bodyPr/>
                     <a:lstStyle/>
                     <a:p>
                       <a:r>
-                        <a:rPr lang="fr-FR" sz="1900"/>
+                        <a:rPr lang="fr-FR" sz="1800" dirty="0"/>
                         <a:t>Catégorie de denrées</a:t>
                       </a:r>
                     </a:p>
                   </a:txBody>
-                  <a:tcPr marL="98226" marR="98226" marT="49113" marB="49113"/>
+                  <a:tcPr marL="96253" marR="96253" marT="48127" marB="48127"/>
                 </a:tc>
                 <a:tc>
                   <a:txBody>
@@ -12640,12 +13982,12 @@
                     <a:lstStyle/>
                     <a:p>
                       <a:r>
-                        <a:rPr lang="fr-FR" sz="1900"/>
+                        <a:rPr lang="fr-FR" sz="1800" dirty="0"/>
                         <a:t>Températures de conservation</a:t>
                       </a:r>
                     </a:p>
                   </a:txBody>
-                  <a:tcPr marL="98226" marR="98226" marT="49113" marB="49113"/>
+                  <a:tcPr marL="96253" marR="96253" marT="48127" marB="48127"/>
                 </a:tc>
                 <a:extLst>
                   <a:ext uri="{0D108BD9-81ED-4DB2-BD59-A6C34878D82A}">
@@ -12653,19 +13995,19 @@
                   </a:ext>
                 </a:extLst>
               </a:tr>
-              <a:tr h="1015393">
+              <a:tr h="994994">
                 <a:tc>
                   <a:txBody>
                     <a:bodyPr/>
                     <a:lstStyle/>
                     <a:p>
                       <a:r>
-                        <a:rPr lang="fr-FR" sz="1900"/>
+                        <a:rPr lang="fr-FR" sz="1800" dirty="0"/>
                         <a:t>Poissons, crustacés et mollusques cuits, viandes cuites</a:t>
                       </a:r>
                     </a:p>
                   </a:txBody>
-                  <a:tcPr marL="98226" marR="98226" marT="49113" marB="49113"/>
+                  <a:tcPr marL="96253" marR="96253" marT="48127" marB="48127"/>
                 </a:tc>
                 <a:tc>
                   <a:txBody>
@@ -12673,12 +14015,12 @@
                     <a:lstStyle/>
                     <a:p>
                       <a:r>
-                        <a:rPr lang="fr-FR" sz="1900"/>
+                        <a:rPr lang="fr-FR" sz="1800"/>
                         <a:t>Entre 0° C à + 4° C </a:t>
                       </a:r>
                     </a:p>
                   </a:txBody>
-                  <a:tcPr marL="98226" marR="98226" marT="49113" marB="49113"/>
+                  <a:tcPr marL="96253" marR="96253" marT="48127" marB="48127"/>
                 </a:tc>
                 <a:extLst>
                   <a:ext uri="{0D108BD9-81ED-4DB2-BD59-A6C34878D82A}">
@@ -12686,19 +14028,19 @@
                   </a:ext>
                 </a:extLst>
               </a:tr>
-              <a:tr h="722023">
+              <a:tr h="707518">
                 <a:tc>
                   <a:txBody>
                     <a:bodyPr/>
                     <a:lstStyle/>
                     <a:p>
                       <a:r>
-                        <a:rPr lang="fr-FR" sz="1900"/>
+                        <a:rPr lang="fr-FR" sz="1800"/>
                         <a:t>Viandes crues, poissons non cuits, charcuteries, etc…</a:t>
                       </a:r>
                     </a:p>
                   </a:txBody>
-                  <a:tcPr marL="98226" marR="98226" marT="49113" marB="49113"/>
+                  <a:tcPr marL="96253" marR="96253" marT="48127" marB="48127"/>
                 </a:tc>
                 <a:tc>
                   <a:txBody>
@@ -12706,12 +14048,12 @@
                     <a:lstStyle/>
                     <a:p>
                       <a:r>
-                        <a:rPr lang="fr-FR" sz="1900"/>
+                        <a:rPr lang="fr-FR" sz="1800"/>
                         <a:t>+ 4° C maximum</a:t>
                       </a:r>
                     </a:p>
                   </a:txBody>
-                  <a:tcPr marL="98226" marR="98226" marT="49113" marB="49113"/>
+                  <a:tcPr marL="96253" marR="96253" marT="48127" marB="48127"/>
                 </a:tc>
                 <a:extLst>
                   <a:ext uri="{0D108BD9-81ED-4DB2-BD59-A6C34878D82A}">
@@ -12719,19 +14061,19 @@
                   </a:ext>
                 </a:extLst>
               </a:tr>
-              <a:tr h="722023">
+              <a:tr h="707518">
                 <a:tc>
                   <a:txBody>
                     <a:bodyPr/>
                     <a:lstStyle/>
                     <a:p>
                       <a:r>
-                        <a:rPr lang="fr-FR" sz="1900"/>
+                        <a:rPr lang="fr-FR" sz="1800"/>
                         <a:t>Fruits et légumes prêts à l'emploi </a:t>
                       </a:r>
                     </a:p>
                   </a:txBody>
-                  <a:tcPr marL="98226" marR="98226" marT="49113" marB="49113"/>
+                  <a:tcPr marL="96253" marR="96253" marT="48127" marB="48127"/>
                 </a:tc>
                 <a:tc>
                   <a:txBody>
@@ -12739,12 +14081,12 @@
                     <a:lstStyle/>
                     <a:p>
                       <a:r>
-                        <a:rPr lang="fr-FR" sz="1900"/>
+                        <a:rPr lang="fr-FR" sz="1800"/>
                         <a:t>+ 4° C</a:t>
                       </a:r>
                     </a:p>
                   </a:txBody>
-                  <a:tcPr marL="98226" marR="98226" marT="49113" marB="49113"/>
+                  <a:tcPr marL="96253" marR="96253" marT="48127" marB="48127"/>
                 </a:tc>
                 <a:extLst>
                   <a:ext uri="{0D108BD9-81ED-4DB2-BD59-A6C34878D82A}">
@@ -12752,19 +14094,19 @@
                   </a:ext>
                 </a:extLst>
               </a:tr>
-              <a:tr h="1015393">
+              <a:tr h="994994">
                 <a:tc>
                   <a:txBody>
                     <a:bodyPr/>
                     <a:lstStyle/>
                     <a:p>
                       <a:r>
-                        <a:rPr lang="fr-FR" sz="1900"/>
+                        <a:rPr lang="fr-FR" sz="1800"/>
                         <a:t>Produits laitiers frais, œufs, desserts lactés, beurres et matières grasses, etc.</a:t>
                       </a:r>
                     </a:p>
                   </a:txBody>
-                  <a:tcPr marL="98226" marR="98226" marT="49113" marB="49113"/>
+                  <a:tcPr marL="96253" marR="96253" marT="48127" marB="48127"/>
                 </a:tc>
                 <a:tc>
                   <a:txBody>
@@ -12772,12 +14114,12 @@
                     <a:lstStyle/>
                     <a:p>
                       <a:r>
-                        <a:rPr lang="fr-FR" sz="1900"/>
+                        <a:rPr lang="fr-FR" sz="1800"/>
                         <a:t>Entre + 6° C à + 8° C </a:t>
                       </a:r>
                     </a:p>
                   </a:txBody>
-                  <a:tcPr marL="98226" marR="98226" marT="49113" marB="49113"/>
+                  <a:tcPr marL="96253" marR="96253" marT="48127" marB="48127"/>
                 </a:tc>
                 <a:extLst>
                   <a:ext uri="{0D108BD9-81ED-4DB2-BD59-A6C34878D82A}">
@@ -12785,19 +14127,19 @@
                   </a:ext>
                 </a:extLst>
               </a:tr>
-              <a:tr h="428653">
+              <a:tr h="420041">
                 <a:tc>
                   <a:txBody>
                     <a:bodyPr/>
                     <a:lstStyle/>
                     <a:p>
                       <a:r>
-                        <a:rPr lang="fr-FR" sz="1900"/>
+                        <a:rPr lang="fr-FR" sz="1800"/>
                         <a:t>Tout aliment congelé</a:t>
                       </a:r>
                     </a:p>
                   </a:txBody>
-                  <a:tcPr marL="98226" marR="98226" marT="49113" marB="49113"/>
+                  <a:tcPr marL="96253" marR="96253" marT="48127" marB="48127"/>
                 </a:tc>
                 <a:tc>
                   <a:txBody>
@@ -12805,12 +14147,12 @@
                     <a:lstStyle/>
                     <a:p>
                       <a:r>
-                        <a:rPr lang="fr-FR" sz="1900"/>
+                        <a:rPr lang="fr-FR" sz="1800"/>
                         <a:t>- 12° C</a:t>
                       </a:r>
                     </a:p>
                   </a:txBody>
-                  <a:tcPr marL="98226" marR="98226" marT="49113" marB="49113"/>
+                  <a:tcPr marL="96253" marR="96253" marT="48127" marB="48127"/>
                 </a:tc>
                 <a:extLst>
                   <a:ext uri="{0D108BD9-81ED-4DB2-BD59-A6C34878D82A}">
@@ -12818,19 +14160,19 @@
                   </a:ext>
                 </a:extLst>
               </a:tr>
-              <a:tr h="428653">
+              <a:tr h="420041">
                 <a:tc>
                   <a:txBody>
                     <a:bodyPr/>
                     <a:lstStyle/>
                     <a:p>
                       <a:r>
-                        <a:rPr lang="fr-FR" sz="1900"/>
+                        <a:rPr lang="fr-FR" sz="1800"/>
                         <a:t>Tout aliment surgelé</a:t>
                       </a:r>
                     </a:p>
                   </a:txBody>
-                  <a:tcPr marL="98226" marR="98226" marT="49113" marB="49113"/>
+                  <a:tcPr marL="96253" marR="96253" marT="48127" marB="48127"/>
                 </a:tc>
                 <a:tc>
                   <a:txBody>
@@ -12838,12 +14180,12 @@
                     <a:lstStyle/>
                     <a:p>
                       <a:r>
-                        <a:rPr lang="fr-FR" sz="1900"/>
+                        <a:rPr lang="fr-FR" sz="1800" dirty="0"/>
                         <a:t>- 18° C </a:t>
                       </a:r>
                     </a:p>
                   </a:txBody>
-                  <a:tcPr marL="98226" marR="98226" marT="49113" marB="49113"/>
+                  <a:tcPr marL="96253" marR="96253" marT="48127" marB="48127"/>
                 </a:tc>
                 <a:extLst>
                   <a:ext uri="{0D108BD9-81ED-4DB2-BD59-A6C34878D82A}">
@@ -13106,13 +14448,154 @@
   <p:clrMapOvr>
     <a:masterClrMapping/>
   </p:clrMapOvr>
-  <p:transition spd="slow">
-    <p:push dir="u"/>
-  </p:transition>
+  <mc:AlternateContent xmlns:mc="http://schemas.openxmlformats.org/markup-compatibility/2006" xmlns:p14="http://schemas.microsoft.com/office/powerpoint/2010/main">
+    <mc:Choice Requires="p14">
+      <p:transition spd="slow" p14:dur="2000">
+        <p:push dir="u"/>
+      </p:transition>
+    </mc:Choice>
+    <mc:Fallback xmlns="">
+      <p:transition spd="slow">
+        <p:push dir="u"/>
+      </p:transition>
+    </mc:Fallback>
+  </mc:AlternateContent>
+  <p:timing>
+    <p:tnLst>
+      <p:par>
+        <p:cTn id="1" dur="indefinite" restart="never" nodeType="tmRoot">
+          <p:childTnLst>
+            <p:seq concurrent="1" nextAc="seek">
+              <p:cTn id="2" dur="indefinite" nodeType="mainSeq">
+                <p:childTnLst>
+                  <p:par>
+                    <p:cTn id="3" fill="hold">
+                      <p:stCondLst>
+                        <p:cond delay="indefinite"/>
+                        <p:cond evt="onBegin" delay="0">
+                          <p:tn val="2"/>
+                        </p:cond>
+                      </p:stCondLst>
+                      <p:childTnLst>
+                        <p:par>
+                          <p:cTn id="4" fill="hold">
+                            <p:stCondLst>
+                              <p:cond delay="0"/>
+                            </p:stCondLst>
+                            <p:childTnLst>
+                              <p:par>
+                                <p:cTn id="5" presetID="47" presetClass="entr" presetSubtype="0" fill="hold" nodeType="withEffect">
+                                  <p:stCondLst>
+                                    <p:cond delay="0"/>
+                                  </p:stCondLst>
+                                  <p:childTnLst>
+                                    <p:set>
+                                      <p:cBhvr>
+                                        <p:cTn id="6" dur="1" fill="hold">
+                                          <p:stCondLst>
+                                            <p:cond delay="0"/>
+                                          </p:stCondLst>
+                                        </p:cTn>
+                                        <p:tgtEl>
+                                          <p:spTgt spid="3"/>
+                                        </p:tgtEl>
+                                        <p:attrNameLst>
+                                          <p:attrName>style.visibility</p:attrName>
+                                        </p:attrNameLst>
+                                      </p:cBhvr>
+                                      <p:to>
+                                        <p:strVal val="visible"/>
+                                      </p:to>
+                                    </p:set>
+                                    <p:animEffect transition="in" filter="fade">
+                                      <p:cBhvr>
+                                        <p:cTn id="7" dur="1000"/>
+                                        <p:tgtEl>
+                                          <p:spTgt spid="3"/>
+                                        </p:tgtEl>
+                                      </p:cBhvr>
+                                    </p:animEffect>
+                                    <p:anim calcmode="lin" valueType="num">
+                                      <p:cBhvr>
+                                        <p:cTn id="8" dur="1000" fill="hold"/>
+                                        <p:tgtEl>
+                                          <p:spTgt spid="3"/>
+                                        </p:tgtEl>
+                                        <p:attrNameLst>
+                                          <p:attrName>ppt_x</p:attrName>
+                                        </p:attrNameLst>
+                                      </p:cBhvr>
+                                      <p:tavLst>
+                                        <p:tav tm="0">
+                                          <p:val>
+                                            <p:strVal val="#ppt_x"/>
+                                          </p:val>
+                                        </p:tav>
+                                        <p:tav tm="100000">
+                                          <p:val>
+                                            <p:strVal val="#ppt_x"/>
+                                          </p:val>
+                                        </p:tav>
+                                      </p:tavLst>
+                                    </p:anim>
+                                    <p:anim calcmode="lin" valueType="num">
+                                      <p:cBhvr>
+                                        <p:cTn id="9" dur="1000" fill="hold"/>
+                                        <p:tgtEl>
+                                          <p:spTgt spid="3"/>
+                                        </p:tgtEl>
+                                        <p:attrNameLst>
+                                          <p:attrName>ppt_y</p:attrName>
+                                        </p:attrNameLst>
+                                      </p:cBhvr>
+                                      <p:tavLst>
+                                        <p:tav tm="0">
+                                          <p:val>
+                                            <p:strVal val="#ppt_y-.1"/>
+                                          </p:val>
+                                        </p:tav>
+                                        <p:tav tm="100000">
+                                          <p:val>
+                                            <p:strVal val="#ppt_y"/>
+                                          </p:val>
+                                        </p:tav>
+                                      </p:tavLst>
+                                    </p:anim>
+                                  </p:childTnLst>
+                                </p:cTn>
+                              </p:par>
+                            </p:childTnLst>
+                          </p:cTn>
+                        </p:par>
+                      </p:childTnLst>
+                    </p:cTn>
+                  </p:par>
+                </p:childTnLst>
+              </p:cTn>
+              <p:prevCondLst>
+                <p:cond evt="onPrev" delay="0">
+                  <p:tgtEl>
+                    <p:sldTgt/>
+                  </p:tgtEl>
+                </p:cond>
+              </p:prevCondLst>
+              <p:nextCondLst>
+                <p:cond evt="onNext" delay="0">
+                  <p:tgtEl>
+                    <p:sldTgt/>
+                  </p:tgtEl>
+                </p:cond>
+              </p:nextCondLst>
+            </p:seq>
+          </p:childTnLst>
+        </p:cTn>
+      </p:par>
+    </p:tnLst>
+  </p:timing>
 </p:sld>
 </file>
 
-<file path=ppt/slides/slide6.xml><?xml version="1.0" encoding="utf-8"?>
+<file path=ppt/slides/slide7.xml><?xml version="1.0" encoding="utf-8"?>
 <p:sld xmlns:a="http://schemas.openxmlformats.org/drawingml/2006/main" xmlns:r="http://schemas.openxmlformats.org/officeDocument/2006/relationships" xmlns:p="http://schemas.openxmlformats.org/presentationml/2006/main">
   <p:cSld>
     <p:spTree>
@@ -14059,9 +15542,18 @@
   <p:clrMapOvr>
     <a:masterClrMapping/>
   </p:clrMapOvr>
-  <p:transition spd="slow">
-    <p:push dir="u"/>
-  </p:transition>
+  <mc:AlternateContent xmlns:mc="http://schemas.openxmlformats.org/markup-compatibility/2006" xmlns:p14="http://schemas.microsoft.com/office/powerpoint/2010/main">
+    <mc:Choice Requires="p14">
+      <p:transition spd="slow" p14:dur="2000">
+        <p:push dir="u"/>
+      </p:transition>
+    </mc:Choice>
+    <mc:Fallback xmlns="">
+      <p:transition spd="slow">
+        <p:push dir="u"/>
+      </p:transition>
+    </mc:Fallback>
+  </mc:AlternateContent>
   <p:timing>
     <p:tnLst>
       <p:par>
@@ -14138,7 +15630,7 @@
 </p:sld>
 </file>
 
-<file path=ppt/slides/slide7.xml><?xml version="1.0" encoding="utf-8"?>
+<file path=ppt/slides/slide8.xml><?xml version="1.0" encoding="utf-8"?>
 <p:sld xmlns:a="http://schemas.openxmlformats.org/drawingml/2006/main" xmlns:r="http://schemas.openxmlformats.org/officeDocument/2006/relationships" xmlns:p="http://schemas.openxmlformats.org/presentationml/2006/main">
   <p:cSld>
     <p:bg>
@@ -14868,9 +16360,18 @@
   <p:clrMapOvr>
     <a:masterClrMapping/>
   </p:clrMapOvr>
-  <p:transition spd="slow">
-    <p:push dir="u"/>
-  </p:transition>
+  <mc:AlternateContent xmlns:mc="http://schemas.openxmlformats.org/markup-compatibility/2006" xmlns:p14="http://schemas.microsoft.com/office/powerpoint/2010/main">
+    <mc:Choice Requires="p14">
+      <p:transition spd="slow" p14:dur="2000">
+        <p:push dir="u"/>
+      </p:transition>
+    </mc:Choice>
+    <mc:Fallback xmlns="">
+      <p:transition spd="slow">
+        <p:push dir="u"/>
+      </p:transition>
+    </mc:Fallback>
+  </mc:AlternateContent>
   <p:timing>
     <p:tnLst>
       <p:par>
@@ -14947,7 +16448,7 @@
 </p:sld>
 </file>
 
-<file path=ppt/slides/slide8.xml><?xml version="1.0" encoding="utf-8"?>
+<file path=ppt/slides/slide9.xml><?xml version="1.0" encoding="utf-8"?>
 <p:sld xmlns:a="http://schemas.openxmlformats.org/drawingml/2006/main" xmlns:r="http://schemas.openxmlformats.org/officeDocument/2006/relationships" xmlns:p="http://schemas.openxmlformats.org/presentationml/2006/main">
   <p:cSld>
     <p:spTree>
@@ -16452,342 +17953,18 @@
   <p:clrMapOvr>
     <a:masterClrMapping/>
   </p:clrMapOvr>
-  <p:transition spd="slow">
-    <p:push dir="u"/>
-  </p:transition>
-</p:sld>
-</file>
-
-<file path=ppt/slides/slide9.xml><?xml version="1.0" encoding="utf-8"?>
-<p:sld xmlns:a="http://schemas.openxmlformats.org/drawingml/2006/main" xmlns:r="http://schemas.openxmlformats.org/officeDocument/2006/relationships" xmlns:p="http://schemas.openxmlformats.org/presentationml/2006/main">
-  <p:cSld>
-    <p:spTree>
-      <p:nvGrpSpPr>
-        <p:cNvPr id="1" name=""/>
-        <p:cNvGrpSpPr/>
-        <p:nvPr/>
-      </p:nvGrpSpPr>
-      <p:grpSpPr>
-        <a:xfrm>
-          <a:off x="0" y="0"/>
-          <a:ext cx="0" cy="0"/>
-          <a:chOff x="0" y="0"/>
-          <a:chExt cx="0" cy="0"/>
-        </a:xfrm>
-      </p:grpSpPr>
-      <p:sp>
-        <p:nvSpPr>
-          <p:cNvPr id="2" name="Titre 1">
-            <a:extLst>
-              <a:ext uri="{FF2B5EF4-FFF2-40B4-BE49-F238E27FC236}">
-                <a16:creationId xmlns:a16="http://schemas.microsoft.com/office/drawing/2014/main" id="{FB3D87DC-1F1D-44F6-BF92-FACAE24261D3}"/>
-              </a:ext>
-            </a:extLst>
-          </p:cNvPr>
-          <p:cNvSpPr>
-            <a:spLocks noGrp="1"/>
-          </p:cNvSpPr>
-          <p:nvPr>
-            <p:ph type="title"/>
-          </p:nvPr>
-        </p:nvSpPr>
-        <p:spPr/>
-        <p:txBody>
-          <a:bodyPr/>
-          <a:lstStyle/>
-          <a:p>
-            <a:r>
-              <a:rPr lang="fr-FR" dirty="0"/>
-              <a:t>Diagramme de cas d’utilisation</a:t>
-            </a:r>
-          </a:p>
-        </p:txBody>
-      </p:sp>
-      <p:pic>
-        <p:nvPicPr>
-          <p:cNvPr id="4" name="Espace réservé du contenu 4">
-            <a:extLst>
-              <a:ext uri="{FF2B5EF4-FFF2-40B4-BE49-F238E27FC236}">
-                <a16:creationId xmlns:a16="http://schemas.microsoft.com/office/drawing/2014/main" id="{EFBED685-8B33-4694-861C-325FB3929A2D}"/>
-              </a:ext>
-            </a:extLst>
-          </p:cNvPr>
-          <p:cNvPicPr>
-            <a:picLocks noChangeAspect="1"/>
-          </p:cNvPicPr>
-          <p:nvPr/>
-        </p:nvPicPr>
-        <p:blipFill>
-          <a:blip r:embed="rId2" cstate="print">
-            <a:lum bright="70000" contrast="-70000"/>
-            <a:extLst>
-              <a:ext uri="{28A0092B-C50C-407E-A947-70E740481C1C}">
-                <a14:useLocalDpi xmlns:a14="http://schemas.microsoft.com/office/drawing/2010/main" val="0"/>
-              </a:ext>
-            </a:extLst>
-          </a:blip>
-          <a:stretch>
-            <a:fillRect/>
-          </a:stretch>
-        </p:blipFill>
-        <p:spPr>
-          <a:xfrm>
-            <a:off x="5495250" y="6318665"/>
-            <a:ext cx="616018" cy="616018"/>
-          </a:xfrm>
-          <a:prstGeom prst="rect">
-            <a:avLst/>
-          </a:prstGeom>
-        </p:spPr>
-      </p:pic>
-      <p:sp>
-        <p:nvSpPr>
-          <p:cNvPr id="5" name="ZoneTexte 4">
-            <a:extLst>
-              <a:ext uri="{FF2B5EF4-FFF2-40B4-BE49-F238E27FC236}">
-                <a16:creationId xmlns:a16="http://schemas.microsoft.com/office/drawing/2014/main" id="{D352F6DE-74E1-483E-B67D-F979EBF3A6E5}"/>
-              </a:ext>
-            </a:extLst>
-          </p:cNvPr>
-          <p:cNvSpPr txBox="1"/>
-          <p:nvPr/>
-        </p:nvSpPr>
-        <p:spPr>
-          <a:xfrm>
-            <a:off x="1693094" y="6442008"/>
-            <a:ext cx="1068371" cy="369332"/>
-          </a:xfrm>
-          <a:prstGeom prst="rect">
-            <a:avLst/>
-          </a:prstGeom>
-          <a:noFill/>
-        </p:spPr>
-        <p:txBody>
-          <a:bodyPr wrap="square" rtlCol="0">
-            <a:spAutoFit/>
-          </a:bodyPr>
-          <a:lstStyle/>
-          <a:p>
-            <a:pPr algn="just"/>
-            <a:r>
-              <a:rPr lang="fr-FR" dirty="0">
-                <a:solidFill>
-                  <a:schemeClr val="bg1"/>
-                </a:solidFill>
-                <a:latin typeface="Agency FB" panose="020B0503020202020204" pitchFamily="34" charset="0"/>
-              </a:rPr>
-              <a:t>Introduction</a:t>
-            </a:r>
-          </a:p>
-        </p:txBody>
-      </p:sp>
-      <p:sp>
-        <p:nvSpPr>
-          <p:cNvPr id="6" name="ZoneTexte 5">
-            <a:extLst>
-              <a:ext uri="{FF2B5EF4-FFF2-40B4-BE49-F238E27FC236}">
-                <a16:creationId xmlns:a16="http://schemas.microsoft.com/office/drawing/2014/main" id="{81D86E08-6339-4383-8325-EDAB76A83C54}"/>
-              </a:ext>
-            </a:extLst>
-          </p:cNvPr>
-          <p:cNvSpPr txBox="1"/>
-          <p:nvPr/>
-        </p:nvSpPr>
-        <p:spPr>
-          <a:xfrm>
-            <a:off x="3409930" y="6442008"/>
-            <a:ext cx="2107024" cy="369332"/>
-          </a:xfrm>
-          <a:prstGeom prst="rect">
-            <a:avLst/>
-          </a:prstGeom>
-          <a:noFill/>
-        </p:spPr>
-        <p:txBody>
-          <a:bodyPr wrap="square" rtlCol="0">
-            <a:spAutoFit/>
-          </a:bodyPr>
-          <a:lstStyle/>
-          <a:p>
-            <a:pPr algn="just"/>
-            <a:r>
-              <a:rPr lang="fr-FR" dirty="0">
-                <a:solidFill>
-                  <a:schemeClr val="bg1"/>
-                </a:solidFill>
-                <a:latin typeface="Agency FB" panose="020B0503020202020204" pitchFamily="34" charset="0"/>
-              </a:rPr>
-              <a:t>Présentation de PROXIDEJ</a:t>
-            </a:r>
-          </a:p>
-        </p:txBody>
-      </p:sp>
-      <p:sp>
-        <p:nvSpPr>
-          <p:cNvPr id="7" name="ZoneTexte 6">
-            <a:extLst>
-              <a:ext uri="{FF2B5EF4-FFF2-40B4-BE49-F238E27FC236}">
-                <a16:creationId xmlns:a16="http://schemas.microsoft.com/office/drawing/2014/main" id="{C9A37364-4A84-47BF-A57F-321191E60553}"/>
-              </a:ext>
-            </a:extLst>
-          </p:cNvPr>
-          <p:cNvSpPr txBox="1"/>
-          <p:nvPr/>
-        </p:nvSpPr>
-        <p:spPr>
-          <a:xfrm>
-            <a:off x="6089564" y="6442008"/>
-            <a:ext cx="1409469" cy="369332"/>
-          </a:xfrm>
-          <a:prstGeom prst="rect">
-            <a:avLst/>
-          </a:prstGeom>
-          <a:noFill/>
-        </p:spPr>
-        <p:txBody>
-          <a:bodyPr wrap="square" rtlCol="0">
-            <a:spAutoFit/>
-          </a:bodyPr>
-          <a:lstStyle/>
-          <a:p>
-            <a:pPr algn="just"/>
-            <a:r>
-              <a:rPr lang="fr-FR" dirty="0">
-                <a:solidFill>
-                  <a:schemeClr val="bg1"/>
-                </a:solidFill>
-                <a:latin typeface="Agency FB" panose="020B0503020202020204" pitchFamily="34" charset="0"/>
-              </a:rPr>
-              <a:t>Projet en groupe</a:t>
-            </a:r>
-          </a:p>
-        </p:txBody>
-      </p:sp>
-      <p:sp>
-        <p:nvSpPr>
-          <p:cNvPr id="8" name="ZoneTexte 7">
-            <a:extLst>
-              <a:ext uri="{FF2B5EF4-FFF2-40B4-BE49-F238E27FC236}">
-                <a16:creationId xmlns:a16="http://schemas.microsoft.com/office/drawing/2014/main" id="{0122A37C-47EF-4B7C-BC12-8DABA46D1C2D}"/>
-              </a:ext>
-            </a:extLst>
-          </p:cNvPr>
-          <p:cNvSpPr txBox="1"/>
-          <p:nvPr/>
-        </p:nvSpPr>
-        <p:spPr>
-          <a:xfrm>
-            <a:off x="8071644" y="6442008"/>
-            <a:ext cx="1409468" cy="369332"/>
-          </a:xfrm>
-          <a:prstGeom prst="rect">
-            <a:avLst/>
-          </a:prstGeom>
-          <a:noFill/>
-        </p:spPr>
-        <p:txBody>
-          <a:bodyPr wrap="square" rtlCol="0">
-            <a:spAutoFit/>
-          </a:bodyPr>
-          <a:lstStyle/>
-          <a:p>
-            <a:pPr algn="just"/>
-            <a:r>
-              <a:rPr lang="fr-FR" dirty="0">
-                <a:solidFill>
-                  <a:schemeClr val="bg1"/>
-                </a:solidFill>
-                <a:latin typeface="Agency FB" panose="020B0503020202020204" pitchFamily="34" charset="0"/>
-              </a:rPr>
-              <a:t>Projet personnel</a:t>
-            </a:r>
-          </a:p>
-        </p:txBody>
-      </p:sp>
-      <p:sp>
-        <p:nvSpPr>
-          <p:cNvPr id="9" name="ZoneTexte 8">
-            <a:extLst>
-              <a:ext uri="{FF2B5EF4-FFF2-40B4-BE49-F238E27FC236}">
-                <a16:creationId xmlns:a16="http://schemas.microsoft.com/office/drawing/2014/main" id="{775A2C69-534C-4F39-AE40-F365CD14DDA9}"/>
-              </a:ext>
-            </a:extLst>
-          </p:cNvPr>
-          <p:cNvSpPr txBox="1"/>
-          <p:nvPr/>
-        </p:nvSpPr>
-        <p:spPr>
-          <a:xfrm>
-            <a:off x="10053722" y="6442008"/>
-            <a:ext cx="1040998" cy="369332"/>
-          </a:xfrm>
-          <a:prstGeom prst="rect">
-            <a:avLst/>
-          </a:prstGeom>
-          <a:noFill/>
-        </p:spPr>
-        <p:txBody>
-          <a:bodyPr wrap="square" rtlCol="0">
-            <a:spAutoFit/>
-          </a:bodyPr>
-          <a:lstStyle/>
-          <a:p>
-            <a:pPr algn="just"/>
-            <a:r>
-              <a:rPr lang="fr-FR" dirty="0">
-                <a:solidFill>
-                  <a:schemeClr val="bg1"/>
-                </a:solidFill>
-                <a:latin typeface="Agency FB" panose="020B0503020202020204" pitchFamily="34" charset="0"/>
-              </a:rPr>
-              <a:t>Conclusion</a:t>
-            </a:r>
-          </a:p>
-        </p:txBody>
-      </p:sp>
-      <p:pic>
-        <p:nvPicPr>
-          <p:cNvPr id="12" name="Image 11">
-            <a:extLst>
-              <a:ext uri="{FF2B5EF4-FFF2-40B4-BE49-F238E27FC236}">
-                <a16:creationId xmlns:a16="http://schemas.microsoft.com/office/drawing/2014/main" id="{4AD395AB-A6D5-46E9-BE82-434A0C631BAB}"/>
-              </a:ext>
-            </a:extLst>
-          </p:cNvPr>
-          <p:cNvPicPr>
-            <a:picLocks noChangeAspect="1"/>
-          </p:cNvPicPr>
-          <p:nvPr/>
-        </p:nvPicPr>
-        <p:blipFill>
-          <a:blip r:embed="rId3"/>
-          <a:stretch>
-            <a:fillRect/>
-          </a:stretch>
-        </p:blipFill>
-        <p:spPr>
-          <a:xfrm>
-            <a:off x="2489309" y="1819965"/>
-            <a:ext cx="6055289" cy="4416095"/>
-          </a:xfrm>
-          <a:prstGeom prst="rect">
-            <a:avLst/>
-          </a:prstGeom>
-        </p:spPr>
-      </p:pic>
-    </p:spTree>
-    <p:extLst>
-      <p:ext uri="{BB962C8B-B14F-4D97-AF65-F5344CB8AC3E}">
-        <p14:creationId xmlns:p14="http://schemas.microsoft.com/office/powerpoint/2010/main" val="726529839"/>
-      </p:ext>
-    </p:extLst>
-  </p:cSld>
-  <p:clrMapOvr>
-    <a:masterClrMapping/>
-  </p:clrMapOvr>
-  <p:transition spd="slow">
-    <p:push dir="u"/>
-  </p:transition>
+  <mc:AlternateContent xmlns:mc="http://schemas.openxmlformats.org/markup-compatibility/2006" xmlns:p14="http://schemas.microsoft.com/office/powerpoint/2010/main">
+    <mc:Choice Requires="p14">
+      <p:transition spd="slow" p14:dur="2000">
+        <p:push dir="u"/>
+      </p:transition>
+    </mc:Choice>
+    <mc:Fallback xmlns="">
+      <p:transition spd="slow">
+        <p:push dir="u"/>
+      </p:transition>
+    </mc:Fallback>
+  </mc:AlternateContent>
 </p:sld>
 </file>
 

</xml_diff>